<commit_message>
Oefeningen HTML CSS JS
</commit_message>
<xml_diff>
--- a/Webdesign.pptx
+++ b/Webdesign.pptx
@@ -5,10 +5,10 @@
     <p:sldMasterId id="2147483712" r:id="rId1"/>
   </p:sldMasterIdLst>
   <p:notesMasterIdLst>
-    <p:notesMasterId r:id="rId66"/>
+    <p:notesMasterId r:id="rId67"/>
   </p:notesMasterIdLst>
   <p:handoutMasterIdLst>
-    <p:handoutMasterId r:id="rId67"/>
+    <p:handoutMasterId r:id="rId68"/>
   </p:handoutMasterIdLst>
   <p:sldIdLst>
     <p:sldId id="257" r:id="rId2"/>
@@ -29,52 +29,53 @@
     <p:sldId id="272" r:id="rId17"/>
     <p:sldId id="271" r:id="rId18"/>
     <p:sldId id="273" r:id="rId19"/>
-    <p:sldId id="277" r:id="rId20"/>
-    <p:sldId id="279" r:id="rId21"/>
-    <p:sldId id="280" r:id="rId22"/>
-    <p:sldId id="281" r:id="rId23"/>
-    <p:sldId id="282" r:id="rId24"/>
-    <p:sldId id="283" r:id="rId25"/>
-    <p:sldId id="284" r:id="rId26"/>
-    <p:sldId id="285" r:id="rId27"/>
-    <p:sldId id="288" r:id="rId28"/>
-    <p:sldId id="286" r:id="rId29"/>
-    <p:sldId id="287" r:id="rId30"/>
-    <p:sldId id="275" r:id="rId31"/>
-    <p:sldId id="274" r:id="rId32"/>
-    <p:sldId id="276" r:id="rId33"/>
-    <p:sldId id="303" r:id="rId34"/>
-    <p:sldId id="304" r:id="rId35"/>
-    <p:sldId id="305" r:id="rId36"/>
-    <p:sldId id="307" r:id="rId37"/>
-    <p:sldId id="312" r:id="rId38"/>
-    <p:sldId id="306" r:id="rId39"/>
-    <p:sldId id="311" r:id="rId40"/>
-    <p:sldId id="308" r:id="rId41"/>
-    <p:sldId id="309" r:id="rId42"/>
-    <p:sldId id="310" r:id="rId43"/>
-    <p:sldId id="289" r:id="rId44"/>
-    <p:sldId id="290" r:id="rId45"/>
-    <p:sldId id="295" r:id="rId46"/>
-    <p:sldId id="301" r:id="rId47"/>
-    <p:sldId id="291" r:id="rId48"/>
-    <p:sldId id="297" r:id="rId49"/>
-    <p:sldId id="292" r:id="rId50"/>
-    <p:sldId id="293" r:id="rId51"/>
-    <p:sldId id="300" r:id="rId52"/>
-    <p:sldId id="313" r:id="rId53"/>
-    <p:sldId id="298" r:id="rId54"/>
-    <p:sldId id="294" r:id="rId55"/>
-    <p:sldId id="314" r:id="rId56"/>
-    <p:sldId id="299" r:id="rId57"/>
-    <p:sldId id="296" r:id="rId58"/>
-    <p:sldId id="315" r:id="rId59"/>
-    <p:sldId id="316" r:id="rId60"/>
-    <p:sldId id="317" r:id="rId61"/>
-    <p:sldId id="318" r:id="rId62"/>
-    <p:sldId id="319" r:id="rId63"/>
-    <p:sldId id="320" r:id="rId64"/>
-    <p:sldId id="321" r:id="rId65"/>
+    <p:sldId id="322" r:id="rId20"/>
+    <p:sldId id="277" r:id="rId21"/>
+    <p:sldId id="279" r:id="rId22"/>
+    <p:sldId id="280" r:id="rId23"/>
+    <p:sldId id="281" r:id="rId24"/>
+    <p:sldId id="282" r:id="rId25"/>
+    <p:sldId id="283" r:id="rId26"/>
+    <p:sldId id="284" r:id="rId27"/>
+    <p:sldId id="285" r:id="rId28"/>
+    <p:sldId id="323" r:id="rId29"/>
+    <p:sldId id="286" r:id="rId30"/>
+    <p:sldId id="287" r:id="rId31"/>
+    <p:sldId id="275" r:id="rId32"/>
+    <p:sldId id="274" r:id="rId33"/>
+    <p:sldId id="276" r:id="rId34"/>
+    <p:sldId id="303" r:id="rId35"/>
+    <p:sldId id="304" r:id="rId36"/>
+    <p:sldId id="305" r:id="rId37"/>
+    <p:sldId id="307" r:id="rId38"/>
+    <p:sldId id="312" r:id="rId39"/>
+    <p:sldId id="306" r:id="rId40"/>
+    <p:sldId id="311" r:id="rId41"/>
+    <p:sldId id="308" r:id="rId42"/>
+    <p:sldId id="309" r:id="rId43"/>
+    <p:sldId id="310" r:id="rId44"/>
+    <p:sldId id="289" r:id="rId45"/>
+    <p:sldId id="290" r:id="rId46"/>
+    <p:sldId id="295" r:id="rId47"/>
+    <p:sldId id="301" r:id="rId48"/>
+    <p:sldId id="291" r:id="rId49"/>
+    <p:sldId id="297" r:id="rId50"/>
+    <p:sldId id="292" r:id="rId51"/>
+    <p:sldId id="293" r:id="rId52"/>
+    <p:sldId id="300" r:id="rId53"/>
+    <p:sldId id="313" r:id="rId54"/>
+    <p:sldId id="298" r:id="rId55"/>
+    <p:sldId id="294" r:id="rId56"/>
+    <p:sldId id="314" r:id="rId57"/>
+    <p:sldId id="299" r:id="rId58"/>
+    <p:sldId id="296" r:id="rId59"/>
+    <p:sldId id="315" r:id="rId60"/>
+    <p:sldId id="316" r:id="rId61"/>
+    <p:sldId id="317" r:id="rId62"/>
+    <p:sldId id="318" r:id="rId63"/>
+    <p:sldId id="319" r:id="rId64"/>
+    <p:sldId id="320" r:id="rId65"/>
+    <p:sldId id="321" r:id="rId66"/>
   </p:sldIdLst>
   <p:sldSz cx="12192000" cy="6858000"/>
   <p:notesSz cx="6858000" cy="9144000"/>
@@ -187,7 +188,7 @@
 <file path=ppt/revisionInfo.xml><?xml version="1.0" encoding="utf-8"?>
 <p1510:revInfo xmlns:a="http://schemas.openxmlformats.org/drawingml/2006/main" xmlns:r="http://schemas.openxmlformats.org/officeDocument/2006/relationships" xmlns:p1510="http://schemas.microsoft.com/office/powerpoint/2015/10/main">
   <p1510:revLst>
-    <p1510:client id="{34570ACE-256F-49A6-9FA2-DA8483C9166B}" v="2" dt="2025-11-21T08:44:55.506"/>
+    <p1510:client id="{B2AA898E-DE0A-4EF9-847C-1F335EDE3A48}" v="3" dt="2026-01-09T04:55:38.466"/>
   </p1510:revLst>
 </p1510:revInfo>
 </file>
@@ -196,40 +197,116 @@
 <pc:chgInfo xmlns:a="http://schemas.openxmlformats.org/drawingml/2006/main" xmlns:r="http://schemas.openxmlformats.org/officeDocument/2006/relationships" xmlns:ac="http://schemas.microsoft.com/office/drawing/2013/main/command" xmlns:pc="http://schemas.microsoft.com/office/powerpoint/2013/main/command">
   <pc:docChgLst>
     <pc:chgData name="Renaud Leroy" userId="135fb8da-5d77-4f74-8269-9536d61f18e3" providerId="ADAL" clId="{E78863E9-63F1-4351-B732-0F17272A4588}"/>
-    <pc:docChg chg="undo custSel addSld modSld">
-      <pc:chgData name="Renaud Leroy" userId="135fb8da-5d77-4f74-8269-9536d61f18e3" providerId="ADAL" clId="{E78863E9-63F1-4351-B732-0F17272A4588}" dt="2025-11-28T08:13:12.516" v="6089" actId="20577"/>
+    <pc:docChg chg="undo custSel addSld delSld modSld">
+      <pc:chgData name="Renaud Leroy" userId="135fb8da-5d77-4f74-8269-9536d61f18e3" providerId="ADAL" clId="{E78863E9-63F1-4351-B732-0F17272A4588}" dt="2026-01-09T04:58:51.923" v="7118" actId="20577"/>
       <pc:docMkLst>
         <pc:docMk/>
       </pc:docMkLst>
-      <pc:sldChg chg="modSp mod">
-        <pc:chgData name="Renaud Leroy" userId="135fb8da-5d77-4f74-8269-9536d61f18e3" providerId="ADAL" clId="{E78863E9-63F1-4351-B732-0F17272A4588}" dt="2025-11-28T08:13:12.516" v="6089" actId="20577"/>
+      <pc:sldChg chg="addSp delSp modSp mod">
+        <pc:chgData name="Renaud Leroy" userId="135fb8da-5d77-4f74-8269-9536d61f18e3" providerId="ADAL" clId="{E78863E9-63F1-4351-B732-0F17272A4588}" dt="2026-01-09T04:39:51.172" v="6178" actId="20577"/>
         <pc:sldMkLst>
           <pc:docMk/>
-          <pc:sldMk cId="1547160706" sldId="300"/>
+          <pc:sldMk cId="4098174705" sldId="273"/>
         </pc:sldMkLst>
         <pc:spChg chg="mod">
-          <ac:chgData name="Renaud Leroy" userId="135fb8da-5d77-4f74-8269-9536d61f18e3" providerId="ADAL" clId="{E78863E9-63F1-4351-B732-0F17272A4588}" dt="2025-11-28T08:13:12.516" v="6089" actId="20577"/>
+          <ac:chgData name="Renaud Leroy" userId="135fb8da-5d77-4f74-8269-9536d61f18e3" providerId="ADAL" clId="{E78863E9-63F1-4351-B732-0F17272A4588}" dt="2026-01-09T04:39:51.172" v="6178" actId="20577"/>
           <ac:spMkLst>
             <pc:docMk/>
-            <pc:sldMk cId="1547160706" sldId="300"/>
-            <ac:spMk id="3" creationId="{C836F053-5EF6-11BF-9078-583F9ADCB9CA}"/>
+            <pc:sldMk cId="4098174705" sldId="273"/>
+            <ac:spMk id="3" creationId="{85E9BE51-C998-A50C-A81E-1FC799BD0DFF}"/>
+          </ac:spMkLst>
+        </pc:spChg>
+        <pc:picChg chg="add del mod">
+          <ac:chgData name="Renaud Leroy" userId="135fb8da-5d77-4f74-8269-9536d61f18e3" providerId="ADAL" clId="{E78863E9-63F1-4351-B732-0F17272A4588}" dt="2026-01-09T04:37:55.712" v="6093" actId="478"/>
+          <ac:picMkLst>
+            <pc:docMk/>
+            <pc:sldMk cId="4098174705" sldId="273"/>
+            <ac:picMk id="5" creationId="{1BFD0294-E26D-488A-3280-A6D46FCFAC99}"/>
+          </ac:picMkLst>
+        </pc:picChg>
+      </pc:sldChg>
+      <pc:sldChg chg="modSp del mod">
+        <pc:chgData name="Renaud Leroy" userId="135fb8da-5d77-4f74-8269-9536d61f18e3" providerId="ADAL" clId="{E78863E9-63F1-4351-B732-0F17272A4588}" dt="2026-01-09T04:57:43.120" v="7083" actId="47"/>
+        <pc:sldMkLst>
+          <pc:docMk/>
+          <pc:sldMk cId="1489733937" sldId="288"/>
+        </pc:sldMkLst>
+        <pc:spChg chg="mod">
+          <ac:chgData name="Renaud Leroy" userId="135fb8da-5d77-4f74-8269-9536d61f18e3" providerId="ADAL" clId="{E78863E9-63F1-4351-B732-0F17272A4588}" dt="2026-01-09T04:50:57.786" v="6866" actId="20577"/>
+          <ac:spMkLst>
+            <pc:docMk/>
+            <pc:sldMk cId="1489733937" sldId="288"/>
+            <ac:spMk id="3" creationId="{E45411DF-1442-8FAD-C9C4-711F8E5BBE84}"/>
           </ac:spMkLst>
         </pc:spChg>
       </pc:sldChg>
-      <pc:sldChg chg="modSp new mod">
-        <pc:chgData name="Renaud Leroy" userId="135fb8da-5d77-4f74-8269-9536d61f18e3" providerId="ADAL" clId="{E78863E9-63F1-4351-B732-0F17272A4588}" dt="2025-11-21T09:19:24.655" v="5848" actId="20577"/>
+      <pc:sldChg chg="modSp mod">
+        <pc:chgData name="Renaud Leroy" userId="135fb8da-5d77-4f74-8269-9536d61f18e3" providerId="ADAL" clId="{E78863E9-63F1-4351-B732-0F17272A4588}" dt="2026-01-09T04:58:27.434" v="7100" actId="20577"/>
         <pc:sldMkLst>
           <pc:docMk/>
-          <pc:sldMk cId="139032914" sldId="321"/>
+          <pc:sldMk cId="4130628188" sldId="308"/>
         </pc:sldMkLst>
         <pc:spChg chg="mod">
-          <ac:chgData name="Renaud Leroy" userId="135fb8da-5d77-4f74-8269-9536d61f18e3" providerId="ADAL" clId="{E78863E9-63F1-4351-B732-0F17272A4588}" dt="2025-11-21T09:19:24.655" v="5848" actId="20577"/>
+          <ac:chgData name="Renaud Leroy" userId="135fb8da-5d77-4f74-8269-9536d61f18e3" providerId="ADAL" clId="{E78863E9-63F1-4351-B732-0F17272A4588}" dt="2026-01-09T04:58:27.434" v="7100" actId="20577"/>
           <ac:spMkLst>
             <pc:docMk/>
-            <pc:sldMk cId="139032914" sldId="321"/>
-            <ac:spMk id="3" creationId="{14460292-D92F-C071-EBF5-FC84552BFC8B}"/>
+            <pc:sldMk cId="4130628188" sldId="308"/>
+            <ac:spMk id="3" creationId="{F327F411-F1D4-9C78-AE6A-AF937B0D182C}"/>
           </ac:spMkLst>
         </pc:spChg>
+      </pc:sldChg>
+      <pc:sldChg chg="modSp mod">
+        <pc:chgData name="Renaud Leroy" userId="135fb8da-5d77-4f74-8269-9536d61f18e3" providerId="ADAL" clId="{E78863E9-63F1-4351-B732-0F17272A4588}" dt="2026-01-09T04:58:51.923" v="7118" actId="20577"/>
+        <pc:sldMkLst>
+          <pc:docMk/>
+          <pc:sldMk cId="2144668814" sldId="310"/>
+        </pc:sldMkLst>
+        <pc:spChg chg="mod">
+          <ac:chgData name="Renaud Leroy" userId="135fb8da-5d77-4f74-8269-9536d61f18e3" providerId="ADAL" clId="{E78863E9-63F1-4351-B732-0F17272A4588}" dt="2026-01-09T04:58:51.923" v="7118" actId="20577"/>
+          <ac:spMkLst>
+            <pc:docMk/>
+            <pc:sldMk cId="2144668814" sldId="310"/>
+            <ac:spMk id="3" creationId="{6FB43E0E-C9ED-313F-1FB1-7F50DB877ABE}"/>
+          </ac:spMkLst>
+        </pc:spChg>
+      </pc:sldChg>
+      <pc:sldChg chg="modSp add mod">
+        <pc:chgData name="Renaud Leroy" userId="135fb8da-5d77-4f74-8269-9536d61f18e3" providerId="ADAL" clId="{E78863E9-63F1-4351-B732-0F17272A4588}" dt="2026-01-09T04:49:04.669" v="6708" actId="20577"/>
+        <pc:sldMkLst>
+          <pc:docMk/>
+          <pc:sldMk cId="3857441359" sldId="322"/>
+        </pc:sldMkLst>
+        <pc:spChg chg="mod">
+          <ac:chgData name="Renaud Leroy" userId="135fb8da-5d77-4f74-8269-9536d61f18e3" providerId="ADAL" clId="{E78863E9-63F1-4351-B732-0F17272A4588}" dt="2026-01-09T04:49:04.669" v="6708" actId="20577"/>
+          <ac:spMkLst>
+            <pc:docMk/>
+            <pc:sldMk cId="3857441359" sldId="322"/>
+            <ac:spMk id="3" creationId="{66FCE825-B1F6-8C99-3DE1-77CC1B6C5EB6}"/>
+          </ac:spMkLst>
+        </pc:spChg>
+      </pc:sldChg>
+      <pc:sldChg chg="addSp modSp add mod">
+        <pc:chgData name="Renaud Leroy" userId="135fb8da-5d77-4f74-8269-9536d61f18e3" providerId="ADAL" clId="{E78863E9-63F1-4351-B732-0F17272A4588}" dt="2026-01-09T04:57:21.768" v="7082" actId="13242"/>
+        <pc:sldMkLst>
+          <pc:docMk/>
+          <pc:sldMk cId="3792445182" sldId="323"/>
+        </pc:sldMkLst>
+        <pc:spChg chg="mod">
+          <ac:chgData name="Renaud Leroy" userId="135fb8da-5d77-4f74-8269-9536d61f18e3" providerId="ADAL" clId="{E78863E9-63F1-4351-B732-0F17272A4588}" dt="2026-01-09T04:53:10.946" v="6925" actId="27636"/>
+          <ac:spMkLst>
+            <pc:docMk/>
+            <pc:sldMk cId="3792445182" sldId="323"/>
+            <ac:spMk id="3" creationId="{10281C4D-4E30-E74A-9149-CB438B49C886}"/>
+          </ac:spMkLst>
+        </pc:spChg>
+        <pc:graphicFrameChg chg="add mod modGraphic">
+          <ac:chgData name="Renaud Leroy" userId="135fb8da-5d77-4f74-8269-9536d61f18e3" providerId="ADAL" clId="{E78863E9-63F1-4351-B732-0F17272A4588}" dt="2026-01-09T04:57:21.768" v="7082" actId="13242"/>
+          <ac:graphicFrameMkLst>
+            <pc:docMk/>
+            <pc:sldMk cId="3792445182" sldId="323"/>
+            <ac:graphicFrameMk id="4" creationId="{A2695B55-736F-4EE7-F2EE-D0C0D6C78892}"/>
+          </ac:graphicFrameMkLst>
+        </pc:graphicFrameChg>
       </pc:sldChg>
     </pc:docChg>
   </pc:docChgLst>
@@ -320,7 +397,7 @@
             <a:pPr rtl="0"/>
             <a:fld id="{5A14EC35-A083-4CA2-A629-54FB374745AC}" type="datetime1">
               <a:rPr lang="nl-NL" smtClean="0"/>
-              <a:t>28-11-2025</a:t>
+              <a:t>9-1-2026</a:t>
             </a:fld>
             <a:endParaRPr lang="en-US" dirty="0"/>
           </a:p>
@@ -490,7 +567,7 @@
             <a:pPr rtl="0"/>
             <a:fld id="{B32F82C2-DE9F-479D-95B3-30B2F9C315A1}" type="datetime1">
               <a:rPr lang="nl-NL" smtClean="0"/>
-              <a:t>28-11-2025</a:t>
+              <a:t>7-1-2026</a:t>
             </a:fld>
             <a:endParaRPr lang="en-US"/>
           </a:p>
@@ -1011,7 +1088,7 @@
             <a:pPr rtl="0"/>
             <a:fld id="{A83A1771-3711-4549-B223-6BFD613711ED}" type="datetime1">
               <a:rPr lang="nl-NL" smtClean="0"/>
-              <a:t>28-11-2025</a:t>
+              <a:t>7-1-2026</a:t>
             </a:fld>
             <a:endParaRPr lang="en-US" dirty="0"/>
           </a:p>
@@ -1218,7 +1295,7 @@
             <a:pPr rtl="0"/>
             <a:fld id="{D08EE877-7E72-4A3F-BF87-CE406B3EE1C5}" type="datetime1">
               <a:rPr lang="nl-NL" smtClean="0"/>
-              <a:t>28-11-2025</a:t>
+              <a:t>7-1-2026</a:t>
             </a:fld>
             <a:endParaRPr lang="en-US" dirty="0"/>
           </a:p>
@@ -1584,7 +1661,7 @@
             <a:pPr rtl="0"/>
             <a:fld id="{4CC54E9F-8ACA-4714-84BB-74BA71865A3C}" type="datetime1">
               <a:rPr lang="nl-NL" smtClean="0"/>
-              <a:t>28-11-2025</a:t>
+              <a:t>7-1-2026</a:t>
             </a:fld>
             <a:endParaRPr lang="en-US" dirty="0"/>
           </a:p>
@@ -2023,7 +2100,7 @@
             <a:pPr rtl="0"/>
             <a:fld id="{66D3D282-C61A-41D7-9714-7814FA67361E}" type="datetime1">
               <a:rPr lang="nl-NL" smtClean="0"/>
-              <a:t>28-11-2025</a:t>
+              <a:t>7-1-2026</a:t>
             </a:fld>
             <a:endParaRPr lang="en-US" dirty="0"/>
           </a:p>
@@ -2280,7 +2357,7 @@
             <a:pPr rtl="0"/>
             <a:fld id="{55CAE64B-8D6D-4B8F-BAE1-453EBC33DDBA}" type="datetime1">
               <a:rPr lang="nl-NL" smtClean="0"/>
-              <a:t>28-11-2025</a:t>
+              <a:t>7-1-2026</a:t>
             </a:fld>
             <a:endParaRPr lang="en-US" dirty="0"/>
           </a:p>
@@ -2706,7 +2783,7 @@
             <a:pPr rtl="0"/>
             <a:fld id="{7DD41833-08F9-41B2-81FC-2883EDAAEF19}" type="datetime1">
               <a:rPr lang="nl-NL" smtClean="0"/>
-              <a:t>28-11-2025</a:t>
+              <a:t>7-1-2026</a:t>
             </a:fld>
             <a:endParaRPr lang="en-US" dirty="0"/>
           </a:p>
@@ -2833,7 +2910,7 @@
             <a:pPr rtl="0"/>
             <a:fld id="{5DC9B189-AE00-478F-84A9-63330A766802}" type="datetime1">
               <a:rPr lang="nl-NL" smtClean="0"/>
-              <a:t>28-11-2025</a:t>
+              <a:t>7-1-2026</a:t>
             </a:fld>
             <a:endParaRPr lang="en-US" dirty="0"/>
           </a:p>
@@ -2931,7 +3008,7 @@
             <a:pPr rtl="0"/>
             <a:fld id="{C4D93972-B93F-42C7-B487-83AAA3F36605}" type="datetime1">
               <a:rPr lang="nl-NL" smtClean="0"/>
-              <a:t>28-11-2025</a:t>
+              <a:t>7-1-2026</a:t>
             </a:fld>
             <a:endParaRPr lang="en-US" dirty="0"/>
           </a:p>
@@ -3312,7 +3389,7 @@
             <a:pPr rtl="0"/>
             <a:fld id="{41CBEB4C-81CC-455E-9331-682EF29A1EAB}" type="datetime1">
               <a:rPr lang="nl-NL" smtClean="0"/>
-              <a:t>28-11-2025</a:t>
+              <a:t>7-1-2026</a:t>
             </a:fld>
             <a:endParaRPr lang="en-US" dirty="0"/>
           </a:p>
@@ -3610,7 +3687,7 @@
             <a:pPr rtl="0"/>
             <a:fld id="{87691925-8A1E-4010-8BF9-64E08633B604}" type="datetime1">
               <a:rPr lang="nl-NL" smtClean="0"/>
-              <a:t>28-11-2025</a:t>
+              <a:t>7-1-2026</a:t>
             </a:fld>
             <a:endParaRPr lang="en-US" dirty="0"/>
           </a:p>
@@ -3828,7 +3905,7 @@
             <a:pPr rtl="0"/>
             <a:fld id="{18D3FD7C-4B51-47DA-BCF4-68F2F2963CDA}" type="datetime1">
               <a:rPr lang="nl-NL" smtClean="0"/>
-              <a:t>28-11-2025</a:t>
+              <a:t>7-1-2026</a:t>
             </a:fld>
             <a:endParaRPr lang="en-US" dirty="0"/>
           </a:p>
@@ -7735,52 +7812,28 @@
             <a:pPr lvl="1"/>
             <a:r>
               <a:rPr lang="nl-BE" dirty="0"/>
-              <a:t>Lijn tekst waarin je jouw favoriete game kort voorstelt. Dit bevat minstens één stuk vette, schuine en onderlijnde tekst.</a:t>
+              <a:t>Lijn tekst waarin je jouw favoriete film kort voorstelt. Dit bevat minstens één stuk vette, schuine en onderlijnde tekst.</a:t>
             </a:r>
           </a:p>
           <a:p>
             <a:pPr lvl="1"/>
             <a:r>
               <a:rPr lang="nl-BE" dirty="0"/>
-              <a:t>Link naar de </a:t>
-            </a:r>
-            <a:r>
-              <a:rPr lang="nl-BE" dirty="0" err="1"/>
-              <a:t>verkoopspagina</a:t>
-            </a:r>
-            <a:r>
-              <a:rPr lang="nl-BE" dirty="0"/>
-              <a:t> van deze game (nieuw tabblad).</a:t>
+              <a:t>Link naar de IMDB-pagina van deze game (nieuw tabblad).</a:t>
             </a:r>
           </a:p>
           <a:p>
             <a:pPr lvl="1"/>
             <a:r>
               <a:rPr lang="nl-BE" dirty="0"/>
-              <a:t>Hieronder een foto van deze game.</a:t>
+              <a:t>Hieronder een foto van deze cover van deze film.</a:t>
             </a:r>
           </a:p>
           <a:p>
             <a:pPr lvl="1"/>
             <a:r>
               <a:rPr lang="nl-BE" dirty="0"/>
-              <a:t>Tabel met minstens 3 </a:t>
-            </a:r>
-            <a:r>
-              <a:rPr lang="nl-BE" dirty="0" err="1"/>
-              <a:t>achievements</a:t>
-            </a:r>
-            <a:r>
-              <a:rPr lang="nl-BE" dirty="0"/>
-              <a:t> van deze game (naam, </a:t>
-            </a:r>
-            <a:r>
-              <a:rPr lang="nl-BE" dirty="0" err="1"/>
-              <a:t>moeilijkheidgraad</a:t>
-            </a:r>
-            <a:r>
-              <a:rPr lang="nl-BE" dirty="0"/>
-              <a:t>, beschrijving)</a:t>
+              <a:t>Tabel met minstens 3 rollen van deze game (rol, acteur, beschrijving)</a:t>
             </a:r>
           </a:p>
           <a:p>
@@ -7807,7 +7860,13 @@
   <p:cSld>
     <p:spTree>
       <p:nvGrpSpPr>
-        <p:cNvPr id="1" name=""/>
+        <p:cNvPr id="1" name="">
+          <a:extLst>
+            <a:ext uri="{FF2B5EF4-FFF2-40B4-BE49-F238E27FC236}">
+              <a16:creationId xmlns:a16="http://schemas.microsoft.com/office/drawing/2014/main" id="{365F733B-026D-0D49-61D2-279A692DCA40}"/>
+            </a:ext>
+          </a:extLst>
+        </p:cNvPr>
         <p:cNvGrpSpPr/>
         <p:nvPr/>
       </p:nvGrpSpPr>
@@ -7824,7 +7883,7 @@
           <p:cNvPr id="2" name="Titel 1">
             <a:extLst>
               <a:ext uri="{FF2B5EF4-FFF2-40B4-BE49-F238E27FC236}">
-                <a16:creationId xmlns:a16="http://schemas.microsoft.com/office/drawing/2014/main" id="{839116A0-B351-F2B4-36DE-1E751DE4F0D5}"/>
+                <a16:creationId xmlns:a16="http://schemas.microsoft.com/office/drawing/2014/main" id="{4016F94C-0DF0-C68F-A1FF-73674612C050}"/>
               </a:ext>
             </a:extLst>
           </p:cNvPr>
@@ -7842,17 +7901,17 @@
           <a:p>
             <a:r>
               <a:rPr lang="nl-BE" dirty="0"/>
-              <a:t>attributen</a:t>
+              <a:t>opdracht</a:t>
             </a:r>
           </a:p>
         </p:txBody>
       </p:sp>
       <p:sp>
         <p:nvSpPr>
-          <p:cNvPr id="3" name="Tijdelijke aanduiding voor tekst 2">
+          <p:cNvPr id="3" name="Tijdelijke aanduiding voor inhoud 2">
             <a:extLst>
               <a:ext uri="{FF2B5EF4-FFF2-40B4-BE49-F238E27FC236}">
-                <a16:creationId xmlns:a16="http://schemas.microsoft.com/office/drawing/2014/main" id="{9C067471-6CB1-9311-E91E-B1B85D009C8A}"/>
+                <a16:creationId xmlns:a16="http://schemas.microsoft.com/office/drawing/2014/main" id="{66FCE825-B1F6-8C99-3DE1-77CC1B6C5EB6}"/>
               </a:ext>
             </a:extLst>
           </p:cNvPr>
@@ -7860,7 +7919,7 @@
             <a:spLocks noGrp="1"/>
           </p:cNvSpPr>
           <p:nvPr>
-            <p:ph type="body" idx="1"/>
+            <p:ph idx="1"/>
           </p:nvPr>
         </p:nvSpPr>
         <p:spPr/>
@@ -7870,45 +7929,47 @@
           <a:p>
             <a:r>
               <a:rPr lang="nl-BE" dirty="0"/>
-              <a:t>algemeen</a:t>
-            </a:r>
-          </a:p>
-        </p:txBody>
-      </p:sp>
-      <p:sp>
-        <p:nvSpPr>
-          <p:cNvPr id="4" name="Tijdelijke aanduiding voor datum 3">
-            <a:extLst>
-              <a:ext uri="{FF2B5EF4-FFF2-40B4-BE49-F238E27FC236}">
-                <a16:creationId xmlns:a16="http://schemas.microsoft.com/office/drawing/2014/main" id="{2F548D53-B63A-99E0-14CC-1C84C19481E0}"/>
-              </a:ext>
-            </a:extLst>
-          </p:cNvPr>
-          <p:cNvSpPr>
-            <a:spLocks noGrp="1"/>
-          </p:cNvSpPr>
-          <p:nvPr>
-            <p:ph type="dt" sz="half" idx="10"/>
-          </p:nvPr>
-        </p:nvSpPr>
-        <p:spPr/>
-        <p:txBody>
-          <a:bodyPr/>
-          <a:lstStyle/>
-          <a:p>
-            <a:pPr rtl="0"/>
-            <a:fld id="{66D3D282-C61A-41D7-9714-7814FA67361E}" type="datetime1">
-              <a:rPr lang="nl-NL" smtClean="0"/>
-              <a:t>28-11-2025</a:t>
-            </a:fld>
-            <a:endParaRPr lang="en-US" dirty="0"/>
+              <a:t>Maak een webpagina met het volgende:</a:t>
+            </a:r>
+          </a:p>
+          <a:p>
+            <a:pPr lvl="1"/>
+            <a:r>
+              <a:rPr lang="nl-BE" dirty="0"/>
+              <a:t>Een tabel met een stand van jouw favoriete sportcompetitie (bv. tennis, hockey, …)</a:t>
+            </a:r>
+          </a:p>
+          <a:p>
+            <a:pPr lvl="1"/>
+            <a:r>
+              <a:rPr lang="nl-BE" dirty="0"/>
+              <a:t>Plaats de naam van het team/sporter in een link die doorverwijst (nieuwe pagina) naar een informatiepagina hierover.</a:t>
+            </a:r>
+          </a:p>
+          <a:p>
+            <a:pPr lvl="1"/>
+            <a:r>
+              <a:rPr lang="nl-BE" dirty="0"/>
+              <a:t>Plaats de totaalpunten in het vet, andere data (aantal wedstrijden, gemaakte punten, …) in cursief.</a:t>
+            </a:r>
+          </a:p>
+          <a:p>
+            <a:pPr lvl="1"/>
+            <a:r>
+              <a:rPr lang="nl-BE" dirty="0"/>
+              <a:t>Plaats onder deze tabel een foto van jouw favoriete sporter.</a:t>
+            </a:r>
+          </a:p>
+          <a:p>
+            <a:pPr lvl="1"/>
+            <a:endParaRPr lang="nl-BE" dirty="0"/>
           </a:p>
         </p:txBody>
       </p:sp>
     </p:spTree>
     <p:extLst>
       <p:ext uri="{BB962C8B-B14F-4D97-AF65-F5344CB8AC3E}">
-        <p14:creationId xmlns:p14="http://schemas.microsoft.com/office/powerpoint/2010/main" val="991720278"/>
+        <p14:creationId xmlns:p14="http://schemas.microsoft.com/office/powerpoint/2010/main" val="3857441359"/>
       </p:ext>
     </p:extLst>
   </p:cSld>
@@ -8026,6 +8087,122 @@
           <p:cNvPr id="2" name="Titel 1">
             <a:extLst>
               <a:ext uri="{FF2B5EF4-FFF2-40B4-BE49-F238E27FC236}">
+                <a16:creationId xmlns:a16="http://schemas.microsoft.com/office/drawing/2014/main" id="{839116A0-B351-F2B4-36DE-1E751DE4F0D5}"/>
+              </a:ext>
+            </a:extLst>
+          </p:cNvPr>
+          <p:cNvSpPr>
+            <a:spLocks noGrp="1"/>
+          </p:cNvSpPr>
+          <p:nvPr>
+            <p:ph type="title"/>
+          </p:nvPr>
+        </p:nvSpPr>
+        <p:spPr/>
+        <p:txBody>
+          <a:bodyPr/>
+          <a:lstStyle/>
+          <a:p>
+            <a:r>
+              <a:rPr lang="nl-BE" dirty="0"/>
+              <a:t>attributen</a:t>
+            </a:r>
+          </a:p>
+        </p:txBody>
+      </p:sp>
+      <p:sp>
+        <p:nvSpPr>
+          <p:cNvPr id="3" name="Tijdelijke aanduiding voor tekst 2">
+            <a:extLst>
+              <a:ext uri="{FF2B5EF4-FFF2-40B4-BE49-F238E27FC236}">
+                <a16:creationId xmlns:a16="http://schemas.microsoft.com/office/drawing/2014/main" id="{9C067471-6CB1-9311-E91E-B1B85D009C8A}"/>
+              </a:ext>
+            </a:extLst>
+          </p:cNvPr>
+          <p:cNvSpPr>
+            <a:spLocks noGrp="1"/>
+          </p:cNvSpPr>
+          <p:nvPr>
+            <p:ph type="body" idx="1"/>
+          </p:nvPr>
+        </p:nvSpPr>
+        <p:spPr/>
+        <p:txBody>
+          <a:bodyPr/>
+          <a:lstStyle/>
+          <a:p>
+            <a:r>
+              <a:rPr lang="nl-BE" dirty="0"/>
+              <a:t>algemeen</a:t>
+            </a:r>
+          </a:p>
+        </p:txBody>
+      </p:sp>
+      <p:sp>
+        <p:nvSpPr>
+          <p:cNvPr id="4" name="Tijdelijke aanduiding voor datum 3">
+            <a:extLst>
+              <a:ext uri="{FF2B5EF4-FFF2-40B4-BE49-F238E27FC236}">
+                <a16:creationId xmlns:a16="http://schemas.microsoft.com/office/drawing/2014/main" id="{2F548D53-B63A-99E0-14CC-1C84C19481E0}"/>
+              </a:ext>
+            </a:extLst>
+          </p:cNvPr>
+          <p:cNvSpPr>
+            <a:spLocks noGrp="1"/>
+          </p:cNvSpPr>
+          <p:nvPr>
+            <p:ph type="dt" sz="half" idx="10"/>
+          </p:nvPr>
+        </p:nvSpPr>
+        <p:spPr/>
+        <p:txBody>
+          <a:bodyPr/>
+          <a:lstStyle/>
+          <a:p>
+            <a:pPr rtl="0"/>
+            <a:fld id="{66D3D282-C61A-41D7-9714-7814FA67361E}" type="datetime1">
+              <a:rPr lang="nl-NL" smtClean="0"/>
+              <a:t>7-1-2026</a:t>
+            </a:fld>
+            <a:endParaRPr lang="en-US" dirty="0"/>
+          </a:p>
+        </p:txBody>
+      </p:sp>
+    </p:spTree>
+    <p:extLst>
+      <p:ext uri="{BB962C8B-B14F-4D97-AF65-F5344CB8AC3E}">
+        <p14:creationId xmlns:p14="http://schemas.microsoft.com/office/powerpoint/2010/main" val="991720278"/>
+      </p:ext>
+    </p:extLst>
+  </p:cSld>
+  <p:clrMapOvr>
+    <a:masterClrMapping/>
+  </p:clrMapOvr>
+</p:sld>
+</file>
+
+<file path=ppt/slides/slide21.xml><?xml version="1.0" encoding="utf-8"?>
+<p:sld xmlns:a="http://schemas.openxmlformats.org/drawingml/2006/main" xmlns:r="http://schemas.openxmlformats.org/officeDocument/2006/relationships" xmlns:p="http://schemas.openxmlformats.org/presentationml/2006/main">
+  <p:cSld>
+    <p:spTree>
+      <p:nvGrpSpPr>
+        <p:cNvPr id="1" name=""/>
+        <p:cNvGrpSpPr/>
+        <p:nvPr/>
+      </p:nvGrpSpPr>
+      <p:grpSpPr>
+        <a:xfrm>
+          <a:off x="0" y="0"/>
+          <a:ext cx="0" cy="0"/>
+          <a:chOff x="0" y="0"/>
+          <a:chExt cx="0" cy="0"/>
+        </a:xfrm>
+      </p:grpSpPr>
+      <p:sp>
+        <p:nvSpPr>
+          <p:cNvPr id="2" name="Titel 1">
+            <a:extLst>
+              <a:ext uri="{FF2B5EF4-FFF2-40B4-BE49-F238E27FC236}">
                 <a16:creationId xmlns:a16="http://schemas.microsoft.com/office/drawing/2014/main" id="{FDEF736C-7866-67A6-DE2E-B34C3A79B207}"/>
               </a:ext>
             </a:extLst>
@@ -8108,7 +8285,7 @@
 </p:sld>
 </file>
 
-<file path=ppt/slides/slide21.xml><?xml version="1.0" encoding="utf-8"?>
+<file path=ppt/slides/slide22.xml><?xml version="1.0" encoding="utf-8"?>
 <p:sld xmlns:a="http://schemas.openxmlformats.org/drawingml/2006/main" xmlns:r="http://schemas.openxmlformats.org/officeDocument/2006/relationships" xmlns:p="http://schemas.openxmlformats.org/presentationml/2006/main">
   <p:cSld>
     <p:spTree>
@@ -8542,7 +8719,7 @@
 </p:sld>
 </file>
 
-<file path=ppt/slides/slide22.xml><?xml version="1.0" encoding="utf-8"?>
+<file path=ppt/slides/slide23.xml><?xml version="1.0" encoding="utf-8"?>
 <p:sld xmlns:a="http://schemas.openxmlformats.org/drawingml/2006/main" xmlns:r="http://schemas.openxmlformats.org/officeDocument/2006/relationships" xmlns:p="http://schemas.openxmlformats.org/presentationml/2006/main">
   <p:cSld>
     <p:spTree>
@@ -8787,7 +8964,7 @@
 </p:sld>
 </file>
 
-<file path=ppt/slides/slide23.xml><?xml version="1.0" encoding="utf-8"?>
+<file path=ppt/slides/slide24.xml><?xml version="1.0" encoding="utf-8"?>
 <p:sld xmlns:a="http://schemas.openxmlformats.org/drawingml/2006/main" xmlns:r="http://schemas.openxmlformats.org/officeDocument/2006/relationships" xmlns:p="http://schemas.openxmlformats.org/presentationml/2006/main">
   <p:cSld>
     <p:spTree>
@@ -9006,7 +9183,7 @@
 </p:sld>
 </file>
 
-<file path=ppt/slides/slide24.xml><?xml version="1.0" encoding="utf-8"?>
+<file path=ppt/slides/slide25.xml><?xml version="1.0" encoding="utf-8"?>
 <p:sld xmlns:a="http://schemas.openxmlformats.org/drawingml/2006/main" xmlns:r="http://schemas.openxmlformats.org/officeDocument/2006/relationships" xmlns:p="http://schemas.openxmlformats.org/presentationml/2006/main">
   <p:cSld>
     <p:spTree>
@@ -9256,7 +9433,7 @@
 </p:sld>
 </file>
 
-<file path=ppt/slides/slide25.xml><?xml version="1.0" encoding="utf-8"?>
+<file path=ppt/slides/slide26.xml><?xml version="1.0" encoding="utf-8"?>
 <p:sld xmlns:a="http://schemas.openxmlformats.org/drawingml/2006/main" xmlns:r="http://schemas.openxmlformats.org/officeDocument/2006/relationships" xmlns:p="http://schemas.openxmlformats.org/presentationml/2006/main">
   <p:cSld>
     <p:spTree>
@@ -9382,7 +9559,7 @@
 </p:sld>
 </file>
 
-<file path=ppt/slides/slide26.xml><?xml version="1.0" encoding="utf-8"?>
+<file path=ppt/slides/slide27.xml><?xml version="1.0" encoding="utf-8"?>
 <p:sld xmlns:a="http://schemas.openxmlformats.org/drawingml/2006/main" xmlns:r="http://schemas.openxmlformats.org/officeDocument/2006/relationships" xmlns:p="http://schemas.openxmlformats.org/presentationml/2006/main">
   <p:cSld>
     <p:spTree>
@@ -9967,12 +10144,18 @@
 </p:sld>
 </file>
 
-<file path=ppt/slides/slide27.xml><?xml version="1.0" encoding="utf-8"?>
+<file path=ppt/slides/slide28.xml><?xml version="1.0" encoding="utf-8"?>
 <p:sld xmlns:a="http://schemas.openxmlformats.org/drawingml/2006/main" xmlns:r="http://schemas.openxmlformats.org/officeDocument/2006/relationships" xmlns:p="http://schemas.openxmlformats.org/presentationml/2006/main">
   <p:cSld>
     <p:spTree>
       <p:nvGrpSpPr>
-        <p:cNvPr id="1" name=""/>
+        <p:cNvPr id="1" name="">
+          <a:extLst>
+            <a:ext uri="{FF2B5EF4-FFF2-40B4-BE49-F238E27FC236}">
+              <a16:creationId xmlns:a16="http://schemas.microsoft.com/office/drawing/2014/main" id="{331130A5-C0FF-D2EA-D3FB-876D03C25858}"/>
+            </a:ext>
+          </a:extLst>
+        </p:cNvPr>
         <p:cNvGrpSpPr/>
         <p:nvPr/>
       </p:nvGrpSpPr>
@@ -9989,7 +10172,7 @@
           <p:cNvPr id="2" name="Titel 1">
             <a:extLst>
               <a:ext uri="{FF2B5EF4-FFF2-40B4-BE49-F238E27FC236}">
-                <a16:creationId xmlns:a16="http://schemas.microsoft.com/office/drawing/2014/main" id="{13E7769F-3E9E-36AE-8D9B-6BBAF9EF98DB}"/>
+                <a16:creationId xmlns:a16="http://schemas.microsoft.com/office/drawing/2014/main" id="{0D3D8618-BE81-1718-28DD-E5776CF7968A}"/>
               </a:ext>
             </a:extLst>
           </p:cNvPr>
@@ -10017,7 +10200,7 @@
           <p:cNvPr id="3" name="Tijdelijke aanduiding voor inhoud 2">
             <a:extLst>
               <a:ext uri="{FF2B5EF4-FFF2-40B4-BE49-F238E27FC236}">
-                <a16:creationId xmlns:a16="http://schemas.microsoft.com/office/drawing/2014/main" id="{E45411DF-1442-8FAD-C9C4-711F8E5BBE84}"/>
+                <a16:creationId xmlns:a16="http://schemas.microsoft.com/office/drawing/2014/main" id="{10281C4D-4E30-E74A-9149-CB438B49C886}"/>
               </a:ext>
             </a:extLst>
           </p:cNvPr>
@@ -10028,9 +10211,16 @@
             <p:ph idx="1"/>
           </p:nvPr>
         </p:nvSpPr>
-        <p:spPr/>
+        <p:spPr>
+          <a:xfrm>
+            <a:off x="581192" y="1757680"/>
+            <a:ext cx="11029615" cy="1330960"/>
+          </a:xfrm>
+        </p:spPr>
         <p:txBody>
-          <a:bodyPr/>
+          <a:bodyPr>
+            <a:normAutofit/>
+          </a:bodyPr>
           <a:lstStyle/>
           <a:p>
             <a:pPr marL="0" indent="0">
@@ -10038,31 +10228,800 @@
             </a:pPr>
             <a:r>
               <a:rPr lang="nl-BE" dirty="0"/>
-              <a:t>Herneem de eerste opdracht en pas minstens 1 </a:t>
-            </a:r>
-            <a:r>
-              <a:rPr lang="nl-BE" dirty="0" err="1"/>
-              <a:t>rowspan</a:t>
-            </a:r>
-            <a:r>
-              <a:rPr lang="nl-BE" dirty="0"/>
-              <a:t> en 1 </a:t>
-            </a:r>
-            <a:r>
-              <a:rPr lang="nl-BE" dirty="0" err="1"/>
-              <a:t>colspan</a:t>
-            </a:r>
-            <a:r>
-              <a:rPr lang="nl-BE" dirty="0"/>
-              <a:t> toe.</a:t>
-            </a:r>
+              <a:t>Neem jouw lesrooster en maak dit na in HTML. Probeer zoveel mogelijk cellen samen te voegen (middagpauze, blokuren, …).</a:t>
+            </a:r>
+          </a:p>
+          <a:p>
+            <a:pPr marL="0" indent="0">
+              <a:buNone/>
+            </a:pPr>
+            <a:r>
+              <a:rPr lang="nl-BE" dirty="0"/>
+              <a:t>Zorg dat de hoofding er als volgt uit zien:</a:t>
+            </a:r>
+          </a:p>
+          <a:p>
+            <a:pPr marL="0" indent="0">
+              <a:buNone/>
+            </a:pPr>
+            <a:endParaRPr lang="nl-BE" dirty="0"/>
           </a:p>
         </p:txBody>
       </p:sp>
+      <p:graphicFrame>
+        <p:nvGraphicFramePr>
+          <p:cNvPr id="4" name="Tabel 3">
+            <a:extLst>
+              <a:ext uri="{FF2B5EF4-FFF2-40B4-BE49-F238E27FC236}">
+                <a16:creationId xmlns:a16="http://schemas.microsoft.com/office/drawing/2014/main" id="{A2695B55-736F-4EE7-F2EE-D0C0D6C78892}"/>
+              </a:ext>
+            </a:extLst>
+          </p:cNvPr>
+          <p:cNvGraphicFramePr>
+            <a:graphicFrameLocks noGrp="1"/>
+          </p:cNvGraphicFramePr>
+          <p:nvPr>
+            <p:extLst>
+              <p:ext uri="{D42A27DB-BD31-4B8C-83A1-F6EECF244321}">
+                <p14:modId xmlns:p14="http://schemas.microsoft.com/office/powerpoint/2010/main" val="625512778"/>
+              </p:ext>
+            </p:extLst>
+          </p:nvPr>
+        </p:nvGraphicFramePr>
+        <p:xfrm>
+          <a:off x="581190" y="2946400"/>
+          <a:ext cx="10767527" cy="3337560"/>
+        </p:xfrm>
+        <a:graphic>
+          <a:graphicData uri="http://schemas.openxmlformats.org/drawingml/2006/table">
+            <a:tbl>
+              <a:tblPr>
+                <a:tableStyleId>{5C22544A-7EE6-4342-B048-85BDC9FD1C3A}</a:tableStyleId>
+              </a:tblPr>
+              <a:tblGrid>
+                <a:gridCol w="2386802">
+                  <a:extLst>
+                    <a:ext uri="{9D8B030D-6E8A-4147-A177-3AD203B41FA5}">
+                      <a16:colId xmlns:a16="http://schemas.microsoft.com/office/drawing/2014/main" val="4098806038"/>
+                    </a:ext>
+                  </a:extLst>
+                </a:gridCol>
+                <a:gridCol w="1676145">
+                  <a:extLst>
+                    <a:ext uri="{9D8B030D-6E8A-4147-A177-3AD203B41FA5}">
+                      <a16:colId xmlns:a16="http://schemas.microsoft.com/office/drawing/2014/main" val="3228870589"/>
+                    </a:ext>
+                  </a:extLst>
+                </a:gridCol>
+                <a:gridCol w="1676145">
+                  <a:extLst>
+                    <a:ext uri="{9D8B030D-6E8A-4147-A177-3AD203B41FA5}">
+                      <a16:colId xmlns:a16="http://schemas.microsoft.com/office/drawing/2014/main" val="567726230"/>
+                    </a:ext>
+                  </a:extLst>
+                </a:gridCol>
+                <a:gridCol w="1676145">
+                  <a:extLst>
+                    <a:ext uri="{9D8B030D-6E8A-4147-A177-3AD203B41FA5}">
+                      <a16:colId xmlns:a16="http://schemas.microsoft.com/office/drawing/2014/main" val="972551165"/>
+                    </a:ext>
+                  </a:extLst>
+                </a:gridCol>
+                <a:gridCol w="1676145">
+                  <a:extLst>
+                    <a:ext uri="{9D8B030D-6E8A-4147-A177-3AD203B41FA5}">
+                      <a16:colId xmlns:a16="http://schemas.microsoft.com/office/drawing/2014/main" val="3295799953"/>
+                    </a:ext>
+                  </a:extLst>
+                </a:gridCol>
+                <a:gridCol w="1676145">
+                  <a:extLst>
+                    <a:ext uri="{9D8B030D-6E8A-4147-A177-3AD203B41FA5}">
+                      <a16:colId xmlns:a16="http://schemas.microsoft.com/office/drawing/2014/main" val="2642018261"/>
+                    </a:ext>
+                  </a:extLst>
+                </a:gridCol>
+              </a:tblGrid>
+              <a:tr h="370840">
+                <a:tc gridSpan="6">
+                  <a:txBody>
+                    <a:bodyPr/>
+                    <a:lstStyle/>
+                    <a:p>
+                      <a:pPr algn="ctr"/>
+                      <a:r>
+                        <a:rPr lang="nl-BE" b="1" dirty="0"/>
+                        <a:t>Lesrooster</a:t>
+                      </a:r>
+                    </a:p>
+                  </a:txBody>
+                  <a:tcPr>
+                    <a:solidFill>
+                      <a:schemeClr val="accent2"/>
+                    </a:solidFill>
+                  </a:tcPr>
+                </a:tc>
+                <a:tc hMerge="1">
+                  <a:txBody>
+                    <a:bodyPr/>
+                    <a:lstStyle/>
+                    <a:p>
+                      <a:endParaRPr lang="nl-BE" dirty="0"/>
+                    </a:p>
+                  </a:txBody>
+                  <a:tcPr/>
+                </a:tc>
+                <a:tc hMerge="1">
+                  <a:txBody>
+                    <a:bodyPr/>
+                    <a:lstStyle/>
+                    <a:p>
+                      <a:endParaRPr lang="nl-BE" dirty="0"/>
+                    </a:p>
+                  </a:txBody>
+                  <a:tcPr/>
+                </a:tc>
+                <a:tc hMerge="1">
+                  <a:txBody>
+                    <a:bodyPr/>
+                    <a:lstStyle/>
+                    <a:p>
+                      <a:endParaRPr lang="nl-BE" dirty="0"/>
+                    </a:p>
+                  </a:txBody>
+                  <a:tcPr/>
+                </a:tc>
+                <a:tc hMerge="1">
+                  <a:txBody>
+                    <a:bodyPr/>
+                    <a:lstStyle/>
+                    <a:p>
+                      <a:endParaRPr lang="nl-BE" dirty="0"/>
+                    </a:p>
+                  </a:txBody>
+                  <a:tcPr/>
+                </a:tc>
+                <a:tc hMerge="1">
+                  <a:txBody>
+                    <a:bodyPr/>
+                    <a:lstStyle/>
+                    <a:p>
+                      <a:endParaRPr lang="nl-BE" dirty="0"/>
+                    </a:p>
+                  </a:txBody>
+                  <a:tcPr/>
+                </a:tc>
+                <a:extLst>
+                  <a:ext uri="{0D108BD9-81ED-4DB2-BD59-A6C34878D82A}">
+                    <a16:rowId xmlns:a16="http://schemas.microsoft.com/office/drawing/2014/main" val="2499266624"/>
+                  </a:ext>
+                </a:extLst>
+              </a:tr>
+              <a:tr h="370840">
+                <a:tc rowSpan="2">
+                  <a:txBody>
+                    <a:bodyPr/>
+                    <a:lstStyle/>
+                    <a:p>
+                      <a:pPr algn="ctr"/>
+                      <a:r>
+                        <a:rPr lang="nl-BE" b="1" dirty="0"/>
+                        <a:t>Lesuur</a:t>
+                      </a:r>
+                    </a:p>
+                  </a:txBody>
+                  <a:tcPr anchor="ctr">
+                    <a:solidFill>
+                      <a:schemeClr val="accent2"/>
+                    </a:solidFill>
+                  </a:tcPr>
+                </a:tc>
+                <a:tc gridSpan="5">
+                  <a:txBody>
+                    <a:bodyPr/>
+                    <a:lstStyle/>
+                    <a:p>
+                      <a:pPr algn="ctr"/>
+                      <a:r>
+                        <a:rPr lang="nl-BE" b="1" dirty="0"/>
+                        <a:t>Dagen</a:t>
+                      </a:r>
+                    </a:p>
+                  </a:txBody>
+                  <a:tcPr>
+                    <a:solidFill>
+                      <a:schemeClr val="accent2"/>
+                    </a:solidFill>
+                  </a:tcPr>
+                </a:tc>
+                <a:tc hMerge="1">
+                  <a:txBody>
+                    <a:bodyPr/>
+                    <a:lstStyle/>
+                    <a:p>
+                      <a:endParaRPr lang="nl-BE" dirty="0"/>
+                    </a:p>
+                  </a:txBody>
+                  <a:tcPr/>
+                </a:tc>
+                <a:tc hMerge="1">
+                  <a:txBody>
+                    <a:bodyPr/>
+                    <a:lstStyle/>
+                    <a:p>
+                      <a:endParaRPr lang="nl-BE" dirty="0"/>
+                    </a:p>
+                  </a:txBody>
+                  <a:tcPr/>
+                </a:tc>
+                <a:tc hMerge="1">
+                  <a:txBody>
+                    <a:bodyPr/>
+                    <a:lstStyle/>
+                    <a:p>
+                      <a:endParaRPr lang="nl-BE" dirty="0"/>
+                    </a:p>
+                  </a:txBody>
+                  <a:tcPr/>
+                </a:tc>
+                <a:tc hMerge="1">
+                  <a:txBody>
+                    <a:bodyPr/>
+                    <a:lstStyle/>
+                    <a:p>
+                      <a:endParaRPr lang="nl-BE" dirty="0"/>
+                    </a:p>
+                  </a:txBody>
+                  <a:tcPr/>
+                </a:tc>
+                <a:extLst>
+                  <a:ext uri="{0D108BD9-81ED-4DB2-BD59-A6C34878D82A}">
+                    <a16:rowId xmlns:a16="http://schemas.microsoft.com/office/drawing/2014/main" val="2747757879"/>
+                  </a:ext>
+                </a:extLst>
+              </a:tr>
+              <a:tr h="370840">
+                <a:tc vMerge="1">
+                  <a:txBody>
+                    <a:bodyPr/>
+                    <a:lstStyle/>
+                    <a:p>
+                      <a:endParaRPr lang="nl-BE" dirty="0"/>
+                    </a:p>
+                  </a:txBody>
+                  <a:tcPr>
+                    <a:solidFill>
+                      <a:schemeClr val="accent2"/>
+                    </a:solidFill>
+                  </a:tcPr>
+                </a:tc>
+                <a:tc>
+                  <a:txBody>
+                    <a:bodyPr/>
+                    <a:lstStyle/>
+                    <a:p>
+                      <a:pPr algn="ctr"/>
+                      <a:r>
+                        <a:rPr lang="nl-BE" b="1" dirty="0"/>
+                        <a:t>Maandag</a:t>
+                      </a:r>
+                    </a:p>
+                  </a:txBody>
+                  <a:tcPr>
+                    <a:solidFill>
+                      <a:schemeClr val="accent2"/>
+                    </a:solidFill>
+                  </a:tcPr>
+                </a:tc>
+                <a:tc>
+                  <a:txBody>
+                    <a:bodyPr/>
+                    <a:lstStyle/>
+                    <a:p>
+                      <a:pPr algn="ctr"/>
+                      <a:r>
+                        <a:rPr lang="nl-BE" b="1" dirty="0"/>
+                        <a:t>Dinsdag</a:t>
+                      </a:r>
+                    </a:p>
+                  </a:txBody>
+                  <a:tcPr>
+                    <a:solidFill>
+                      <a:schemeClr val="accent2"/>
+                    </a:solidFill>
+                  </a:tcPr>
+                </a:tc>
+                <a:tc>
+                  <a:txBody>
+                    <a:bodyPr/>
+                    <a:lstStyle/>
+                    <a:p>
+                      <a:pPr algn="ctr"/>
+                      <a:r>
+                        <a:rPr lang="nl-BE" b="1" dirty="0"/>
+                        <a:t>Woensdag</a:t>
+                      </a:r>
+                    </a:p>
+                  </a:txBody>
+                  <a:tcPr>
+                    <a:solidFill>
+                      <a:schemeClr val="accent2"/>
+                    </a:solidFill>
+                  </a:tcPr>
+                </a:tc>
+                <a:tc>
+                  <a:txBody>
+                    <a:bodyPr/>
+                    <a:lstStyle/>
+                    <a:p>
+                      <a:pPr algn="ctr"/>
+                      <a:r>
+                        <a:rPr lang="nl-BE" b="1" dirty="0"/>
+                        <a:t>Donderdag</a:t>
+                      </a:r>
+                    </a:p>
+                  </a:txBody>
+                  <a:tcPr>
+                    <a:solidFill>
+                      <a:schemeClr val="accent2"/>
+                    </a:solidFill>
+                  </a:tcPr>
+                </a:tc>
+                <a:tc>
+                  <a:txBody>
+                    <a:bodyPr/>
+                    <a:lstStyle/>
+                    <a:p>
+                      <a:pPr algn="ctr"/>
+                      <a:r>
+                        <a:rPr lang="nl-BE" b="1" dirty="0"/>
+                        <a:t>Vrijdag</a:t>
+                      </a:r>
+                    </a:p>
+                  </a:txBody>
+                  <a:tcPr>
+                    <a:solidFill>
+                      <a:schemeClr val="accent2"/>
+                    </a:solidFill>
+                  </a:tcPr>
+                </a:tc>
+                <a:extLst>
+                  <a:ext uri="{0D108BD9-81ED-4DB2-BD59-A6C34878D82A}">
+                    <a16:rowId xmlns:a16="http://schemas.microsoft.com/office/drawing/2014/main" val="4227400426"/>
+                  </a:ext>
+                </a:extLst>
+              </a:tr>
+              <a:tr h="370840">
+                <a:tc>
+                  <a:txBody>
+                    <a:bodyPr/>
+                    <a:lstStyle/>
+                    <a:p>
+                      <a:r>
+                        <a:rPr lang="nl-BE" dirty="0"/>
+                        <a:t>1</a:t>
+                      </a:r>
+                    </a:p>
+                  </a:txBody>
+                  <a:tcPr/>
+                </a:tc>
+                <a:tc>
+                  <a:txBody>
+                    <a:bodyPr/>
+                    <a:lstStyle/>
+                    <a:p>
+                      <a:endParaRPr lang="nl-BE" dirty="0"/>
+                    </a:p>
+                  </a:txBody>
+                  <a:tcPr/>
+                </a:tc>
+                <a:tc>
+                  <a:txBody>
+                    <a:bodyPr/>
+                    <a:lstStyle/>
+                    <a:p>
+                      <a:endParaRPr lang="nl-BE" dirty="0"/>
+                    </a:p>
+                  </a:txBody>
+                  <a:tcPr/>
+                </a:tc>
+                <a:tc>
+                  <a:txBody>
+                    <a:bodyPr/>
+                    <a:lstStyle/>
+                    <a:p>
+                      <a:endParaRPr lang="nl-BE"/>
+                    </a:p>
+                  </a:txBody>
+                  <a:tcPr/>
+                </a:tc>
+                <a:tc rowSpan="3">
+                  <a:txBody>
+                    <a:bodyPr/>
+                    <a:lstStyle/>
+                    <a:p>
+                      <a:r>
+                        <a:rPr lang="nl-BE" dirty="0"/>
+                        <a:t>Software</a:t>
+                      </a:r>
+                    </a:p>
+                  </a:txBody>
+                  <a:tcPr/>
+                </a:tc>
+                <a:tc rowSpan="2">
+                  <a:txBody>
+                    <a:bodyPr/>
+                    <a:lstStyle/>
+                    <a:p>
+                      <a:r>
+                        <a:rPr lang="nl-BE" dirty="0"/>
+                        <a:t>Web-development</a:t>
+                      </a:r>
+                    </a:p>
+                  </a:txBody>
+                  <a:tcPr/>
+                </a:tc>
+                <a:extLst>
+                  <a:ext uri="{0D108BD9-81ED-4DB2-BD59-A6C34878D82A}">
+                    <a16:rowId xmlns:a16="http://schemas.microsoft.com/office/drawing/2014/main" val="4077594151"/>
+                  </a:ext>
+                </a:extLst>
+              </a:tr>
+              <a:tr h="370840">
+                <a:tc>
+                  <a:txBody>
+                    <a:bodyPr/>
+                    <a:lstStyle/>
+                    <a:p>
+                      <a:r>
+                        <a:rPr lang="nl-BE" dirty="0"/>
+                        <a:t>2</a:t>
+                      </a:r>
+                    </a:p>
+                  </a:txBody>
+                  <a:tcPr/>
+                </a:tc>
+                <a:tc>
+                  <a:txBody>
+                    <a:bodyPr/>
+                    <a:lstStyle/>
+                    <a:p>
+                      <a:endParaRPr lang="nl-BE" dirty="0"/>
+                    </a:p>
+                  </a:txBody>
+                  <a:tcPr/>
+                </a:tc>
+                <a:tc>
+                  <a:txBody>
+                    <a:bodyPr/>
+                    <a:lstStyle/>
+                    <a:p>
+                      <a:endParaRPr lang="nl-BE" dirty="0"/>
+                    </a:p>
+                  </a:txBody>
+                  <a:tcPr/>
+                </a:tc>
+                <a:tc>
+                  <a:txBody>
+                    <a:bodyPr/>
+                    <a:lstStyle/>
+                    <a:p>
+                      <a:endParaRPr lang="nl-BE"/>
+                    </a:p>
+                  </a:txBody>
+                  <a:tcPr/>
+                </a:tc>
+                <a:tc vMerge="1">
+                  <a:txBody>
+                    <a:bodyPr/>
+                    <a:lstStyle/>
+                    <a:p>
+                      <a:endParaRPr lang="nl-BE" dirty="0"/>
+                    </a:p>
+                  </a:txBody>
+                  <a:tcPr/>
+                </a:tc>
+                <a:tc vMerge="1">
+                  <a:txBody>
+                    <a:bodyPr/>
+                    <a:lstStyle/>
+                    <a:p>
+                      <a:endParaRPr lang="nl-BE" dirty="0"/>
+                    </a:p>
+                  </a:txBody>
+                  <a:tcPr/>
+                </a:tc>
+                <a:extLst>
+                  <a:ext uri="{0D108BD9-81ED-4DB2-BD59-A6C34878D82A}">
+                    <a16:rowId xmlns:a16="http://schemas.microsoft.com/office/drawing/2014/main" val="4090836444"/>
+                  </a:ext>
+                </a:extLst>
+              </a:tr>
+              <a:tr h="370840">
+                <a:tc>
+                  <a:txBody>
+                    <a:bodyPr/>
+                    <a:lstStyle/>
+                    <a:p>
+                      <a:r>
+                        <a:rPr lang="nl-BE" dirty="0"/>
+                        <a:t>3</a:t>
+                      </a:r>
+                    </a:p>
+                  </a:txBody>
+                  <a:tcPr/>
+                </a:tc>
+                <a:tc>
+                  <a:txBody>
+                    <a:bodyPr/>
+                    <a:lstStyle/>
+                    <a:p>
+                      <a:endParaRPr lang="nl-BE" dirty="0"/>
+                    </a:p>
+                  </a:txBody>
+                  <a:tcPr/>
+                </a:tc>
+                <a:tc>
+                  <a:txBody>
+                    <a:bodyPr/>
+                    <a:lstStyle/>
+                    <a:p>
+                      <a:endParaRPr lang="nl-BE" dirty="0"/>
+                    </a:p>
+                  </a:txBody>
+                  <a:tcPr/>
+                </a:tc>
+                <a:tc>
+                  <a:txBody>
+                    <a:bodyPr/>
+                    <a:lstStyle/>
+                    <a:p>
+                      <a:endParaRPr lang="nl-BE" dirty="0"/>
+                    </a:p>
+                  </a:txBody>
+                  <a:tcPr/>
+                </a:tc>
+                <a:tc vMerge="1">
+                  <a:txBody>
+                    <a:bodyPr/>
+                    <a:lstStyle/>
+                    <a:p>
+                      <a:endParaRPr lang="nl-BE" dirty="0"/>
+                    </a:p>
+                  </a:txBody>
+                  <a:tcPr/>
+                </a:tc>
+                <a:tc>
+                  <a:txBody>
+                    <a:bodyPr/>
+                    <a:lstStyle/>
+                    <a:p>
+                      <a:endParaRPr lang="nl-BE"/>
+                    </a:p>
+                  </a:txBody>
+                  <a:tcPr/>
+                </a:tc>
+                <a:extLst>
+                  <a:ext uri="{0D108BD9-81ED-4DB2-BD59-A6C34878D82A}">
+                    <a16:rowId xmlns:a16="http://schemas.microsoft.com/office/drawing/2014/main" val="3003994048"/>
+                  </a:ext>
+                </a:extLst>
+              </a:tr>
+              <a:tr h="370840">
+                <a:tc>
+                  <a:txBody>
+                    <a:bodyPr/>
+                    <a:lstStyle/>
+                    <a:p>
+                      <a:r>
+                        <a:rPr lang="nl-BE" dirty="0"/>
+                        <a:t>4</a:t>
+                      </a:r>
+                    </a:p>
+                  </a:txBody>
+                  <a:tcPr/>
+                </a:tc>
+                <a:tc>
+                  <a:txBody>
+                    <a:bodyPr/>
+                    <a:lstStyle/>
+                    <a:p>
+                      <a:endParaRPr lang="nl-BE" dirty="0"/>
+                    </a:p>
+                  </a:txBody>
+                  <a:tcPr/>
+                </a:tc>
+                <a:tc>
+                  <a:txBody>
+                    <a:bodyPr/>
+                    <a:lstStyle/>
+                    <a:p>
+                      <a:endParaRPr lang="nl-BE" dirty="0"/>
+                    </a:p>
+                  </a:txBody>
+                  <a:tcPr/>
+                </a:tc>
+                <a:tc>
+                  <a:txBody>
+                    <a:bodyPr/>
+                    <a:lstStyle/>
+                    <a:p>
+                      <a:endParaRPr lang="nl-BE" dirty="0"/>
+                    </a:p>
+                  </a:txBody>
+                  <a:tcPr/>
+                </a:tc>
+                <a:tc>
+                  <a:txBody>
+                    <a:bodyPr/>
+                    <a:lstStyle/>
+                    <a:p>
+                      <a:endParaRPr lang="nl-BE" dirty="0"/>
+                    </a:p>
+                  </a:txBody>
+                  <a:tcPr/>
+                </a:tc>
+                <a:tc>
+                  <a:txBody>
+                    <a:bodyPr/>
+                    <a:lstStyle/>
+                    <a:p>
+                      <a:endParaRPr lang="nl-BE" dirty="0"/>
+                    </a:p>
+                  </a:txBody>
+                  <a:tcPr/>
+                </a:tc>
+                <a:extLst>
+                  <a:ext uri="{0D108BD9-81ED-4DB2-BD59-A6C34878D82A}">
+                    <a16:rowId xmlns:a16="http://schemas.microsoft.com/office/drawing/2014/main" val="602934648"/>
+                  </a:ext>
+                </a:extLst>
+              </a:tr>
+              <a:tr h="370840">
+                <a:tc>
+                  <a:txBody>
+                    <a:bodyPr/>
+                    <a:lstStyle/>
+                    <a:p>
+                      <a:r>
+                        <a:rPr lang="nl-BE" dirty="0"/>
+                        <a:t>Middagpauze</a:t>
+                      </a:r>
+                    </a:p>
+                  </a:txBody>
+                  <a:tcPr/>
+                </a:tc>
+                <a:tc gridSpan="5">
+                  <a:txBody>
+                    <a:bodyPr/>
+                    <a:lstStyle/>
+                    <a:p>
+                      <a:endParaRPr lang="nl-BE" dirty="0"/>
+                    </a:p>
+                  </a:txBody>
+                  <a:tcPr/>
+                </a:tc>
+                <a:tc hMerge="1">
+                  <a:txBody>
+                    <a:bodyPr/>
+                    <a:lstStyle/>
+                    <a:p>
+                      <a:endParaRPr lang="nl-BE" dirty="0"/>
+                    </a:p>
+                  </a:txBody>
+                  <a:tcPr/>
+                </a:tc>
+                <a:tc hMerge="1">
+                  <a:txBody>
+                    <a:bodyPr/>
+                    <a:lstStyle/>
+                    <a:p>
+                      <a:endParaRPr lang="nl-BE" dirty="0"/>
+                    </a:p>
+                  </a:txBody>
+                  <a:tcPr/>
+                </a:tc>
+                <a:tc hMerge="1">
+                  <a:txBody>
+                    <a:bodyPr/>
+                    <a:lstStyle/>
+                    <a:p>
+                      <a:endParaRPr lang="nl-BE" dirty="0"/>
+                    </a:p>
+                  </a:txBody>
+                  <a:tcPr/>
+                </a:tc>
+                <a:tc hMerge="1">
+                  <a:txBody>
+                    <a:bodyPr/>
+                    <a:lstStyle/>
+                    <a:p>
+                      <a:endParaRPr lang="nl-BE" dirty="0"/>
+                    </a:p>
+                  </a:txBody>
+                  <a:tcPr/>
+                </a:tc>
+                <a:extLst>
+                  <a:ext uri="{0D108BD9-81ED-4DB2-BD59-A6C34878D82A}">
+                    <a16:rowId xmlns:a16="http://schemas.microsoft.com/office/drawing/2014/main" val="1549608894"/>
+                  </a:ext>
+                </a:extLst>
+              </a:tr>
+              <a:tr h="370840">
+                <a:tc>
+                  <a:txBody>
+                    <a:bodyPr/>
+                    <a:lstStyle/>
+                    <a:p>
+                      <a:endParaRPr lang="nl-BE" dirty="0"/>
+                    </a:p>
+                  </a:txBody>
+                  <a:tcPr/>
+                </a:tc>
+                <a:tc>
+                  <a:txBody>
+                    <a:bodyPr/>
+                    <a:lstStyle/>
+                    <a:p>
+                      <a:endParaRPr lang="nl-BE"/>
+                    </a:p>
+                  </a:txBody>
+                  <a:tcPr/>
+                </a:tc>
+                <a:tc>
+                  <a:txBody>
+                    <a:bodyPr/>
+                    <a:lstStyle/>
+                    <a:p>
+                      <a:endParaRPr lang="nl-BE" dirty="0"/>
+                    </a:p>
+                  </a:txBody>
+                  <a:tcPr/>
+                </a:tc>
+                <a:tc>
+                  <a:txBody>
+                    <a:bodyPr/>
+                    <a:lstStyle/>
+                    <a:p>
+                      <a:endParaRPr lang="nl-BE"/>
+                    </a:p>
+                  </a:txBody>
+                  <a:tcPr/>
+                </a:tc>
+                <a:tc>
+                  <a:txBody>
+                    <a:bodyPr/>
+                    <a:lstStyle/>
+                    <a:p>
+                      <a:endParaRPr lang="nl-BE" dirty="0"/>
+                    </a:p>
+                  </a:txBody>
+                  <a:tcPr/>
+                </a:tc>
+                <a:tc>
+                  <a:txBody>
+                    <a:bodyPr/>
+                    <a:lstStyle/>
+                    <a:p>
+                      <a:endParaRPr lang="nl-BE" dirty="0"/>
+                    </a:p>
+                  </a:txBody>
+                  <a:tcPr/>
+                </a:tc>
+                <a:extLst>
+                  <a:ext uri="{0D108BD9-81ED-4DB2-BD59-A6C34878D82A}">
+                    <a16:rowId xmlns:a16="http://schemas.microsoft.com/office/drawing/2014/main" val="2114152368"/>
+                  </a:ext>
+                </a:extLst>
+              </a:tr>
+            </a:tbl>
+          </a:graphicData>
+        </a:graphic>
+      </p:graphicFrame>
     </p:spTree>
     <p:extLst>
       <p:ext uri="{BB962C8B-B14F-4D97-AF65-F5344CB8AC3E}">
-        <p14:creationId xmlns:p14="http://schemas.microsoft.com/office/powerpoint/2010/main" val="1489733937"/>
+        <p14:creationId xmlns:p14="http://schemas.microsoft.com/office/powerpoint/2010/main" val="3792445182"/>
       </p:ext>
     </p:extLst>
   </p:cSld>
@@ -10072,7 +11031,7 @@
 </p:sld>
 </file>
 
-<file path=ppt/slides/slide28.xml><?xml version="1.0" encoding="utf-8"?>
+<file path=ppt/slides/slide29.xml><?xml version="1.0" encoding="utf-8"?>
 <p:sld xmlns:a="http://schemas.openxmlformats.org/drawingml/2006/main" xmlns:r="http://schemas.openxmlformats.org/officeDocument/2006/relationships" xmlns:p="http://schemas.openxmlformats.org/presentationml/2006/main">
   <p:cSld>
     <p:spTree>
@@ -10575,146 +11534,6 @@
     <p:extLst>
       <p:ext uri="{BB962C8B-B14F-4D97-AF65-F5344CB8AC3E}">
         <p14:creationId xmlns:p14="http://schemas.microsoft.com/office/powerpoint/2010/main" val="1832345921"/>
-      </p:ext>
-    </p:extLst>
-  </p:cSld>
-  <p:clrMapOvr>
-    <a:masterClrMapping/>
-  </p:clrMapOvr>
-</p:sld>
-</file>
-
-<file path=ppt/slides/slide29.xml><?xml version="1.0" encoding="utf-8"?>
-<p:sld xmlns:a="http://schemas.openxmlformats.org/drawingml/2006/main" xmlns:r="http://schemas.openxmlformats.org/officeDocument/2006/relationships" xmlns:p="http://schemas.openxmlformats.org/presentationml/2006/main">
-  <p:cSld>
-    <p:spTree>
-      <p:nvGrpSpPr>
-        <p:cNvPr id="1" name=""/>
-        <p:cNvGrpSpPr/>
-        <p:nvPr/>
-      </p:nvGrpSpPr>
-      <p:grpSpPr>
-        <a:xfrm>
-          <a:off x="0" y="0"/>
-          <a:ext cx="0" cy="0"/>
-          <a:chOff x="0" y="0"/>
-          <a:chExt cx="0" cy="0"/>
-        </a:xfrm>
-      </p:grpSpPr>
-      <p:sp>
-        <p:nvSpPr>
-          <p:cNvPr id="2" name="Titel 1">
-            <a:extLst>
-              <a:ext uri="{FF2B5EF4-FFF2-40B4-BE49-F238E27FC236}">
-                <a16:creationId xmlns:a16="http://schemas.microsoft.com/office/drawing/2014/main" id="{3B5862F5-4BD7-C7FD-410A-CBAE474D753C}"/>
-              </a:ext>
-            </a:extLst>
-          </p:cNvPr>
-          <p:cNvSpPr>
-            <a:spLocks noGrp="1"/>
-          </p:cNvSpPr>
-          <p:nvPr>
-            <p:ph type="title"/>
-          </p:nvPr>
-        </p:nvSpPr>
-        <p:spPr/>
-        <p:txBody>
-          <a:bodyPr/>
-          <a:lstStyle/>
-          <a:p>
-            <a:r>
-              <a:rPr lang="nl-BE" dirty="0"/>
-              <a:t>Ongeordende lijst: </a:t>
-            </a:r>
-            <a:r>
-              <a:rPr lang="nl-BE" dirty="0" err="1"/>
-              <a:t>style</a:t>
-            </a:r>
-            <a:r>
-              <a:rPr lang="nl-BE" dirty="0"/>
-              <a:t>: list-</a:t>
-            </a:r>
-            <a:r>
-              <a:rPr lang="nl-BE" dirty="0" err="1"/>
-              <a:t>style</a:t>
-            </a:r>
-            <a:r>
-              <a:rPr lang="nl-BE" dirty="0"/>
-              <a:t>-type</a:t>
-            </a:r>
-          </a:p>
-        </p:txBody>
-      </p:sp>
-      <p:sp>
-        <p:nvSpPr>
-          <p:cNvPr id="3" name="Tijdelijke aanduiding voor inhoud 2">
-            <a:extLst>
-              <a:ext uri="{FF2B5EF4-FFF2-40B4-BE49-F238E27FC236}">
-                <a16:creationId xmlns:a16="http://schemas.microsoft.com/office/drawing/2014/main" id="{B34DA328-D237-3725-E55B-E939FAE4F1C0}"/>
-              </a:ext>
-            </a:extLst>
-          </p:cNvPr>
-          <p:cNvSpPr>
-            <a:spLocks noGrp="1"/>
-          </p:cNvSpPr>
-          <p:nvPr>
-            <p:ph idx="1"/>
-          </p:nvPr>
-        </p:nvSpPr>
-        <p:spPr/>
-        <p:txBody>
-          <a:bodyPr/>
-          <a:lstStyle/>
-          <a:p>
-            <a:r>
-              <a:rPr lang="nl-BE" dirty="0"/>
-              <a:t>Bij ongeordende lijsten kan je d.m.v. het </a:t>
-            </a:r>
-            <a:r>
-              <a:rPr lang="nl-BE" dirty="0" err="1"/>
-              <a:t>style</a:t>
-            </a:r>
-            <a:r>
-              <a:rPr lang="nl-BE" dirty="0"/>
-              <a:t>-attribuut een list-</a:t>
-            </a:r>
-            <a:r>
-              <a:rPr lang="nl-BE" dirty="0" err="1"/>
-              <a:t>style</a:t>
-            </a:r>
-            <a:r>
-              <a:rPr lang="nl-BE" dirty="0"/>
-              <a:t>-type instellen:</a:t>
-            </a:r>
-          </a:p>
-          <a:p>
-            <a:pPr lvl="1"/>
-            <a:r>
-              <a:rPr lang="nl-BE" dirty="0" err="1"/>
-              <a:t>Circle</a:t>
-            </a:r>
-            <a:endParaRPr lang="nl-BE" dirty="0"/>
-          </a:p>
-          <a:p>
-            <a:pPr lvl="1"/>
-            <a:r>
-              <a:rPr lang="nl-BE" dirty="0"/>
-              <a:t>Disc</a:t>
-            </a:r>
-          </a:p>
-          <a:p>
-            <a:pPr lvl="1"/>
-            <a:r>
-              <a:rPr lang="nl-BE" dirty="0"/>
-              <a:t>Square</a:t>
-            </a:r>
-          </a:p>
-        </p:txBody>
-      </p:sp>
-    </p:spTree>
-    <p:extLst>
-      <p:ext uri="{BB962C8B-B14F-4D97-AF65-F5344CB8AC3E}">
-        <p14:creationId xmlns:p14="http://schemas.microsoft.com/office/powerpoint/2010/main" val="1676160336"/>
       </p:ext>
     </p:extLst>
   </p:cSld>
@@ -10878,6 +11697,146 @@
           <p:cNvPr id="2" name="Titel 1">
             <a:extLst>
               <a:ext uri="{FF2B5EF4-FFF2-40B4-BE49-F238E27FC236}">
+                <a16:creationId xmlns:a16="http://schemas.microsoft.com/office/drawing/2014/main" id="{3B5862F5-4BD7-C7FD-410A-CBAE474D753C}"/>
+              </a:ext>
+            </a:extLst>
+          </p:cNvPr>
+          <p:cNvSpPr>
+            <a:spLocks noGrp="1"/>
+          </p:cNvSpPr>
+          <p:nvPr>
+            <p:ph type="title"/>
+          </p:nvPr>
+        </p:nvSpPr>
+        <p:spPr/>
+        <p:txBody>
+          <a:bodyPr/>
+          <a:lstStyle/>
+          <a:p>
+            <a:r>
+              <a:rPr lang="nl-BE" dirty="0"/>
+              <a:t>Ongeordende lijst: </a:t>
+            </a:r>
+            <a:r>
+              <a:rPr lang="nl-BE" dirty="0" err="1"/>
+              <a:t>style</a:t>
+            </a:r>
+            <a:r>
+              <a:rPr lang="nl-BE" dirty="0"/>
+              <a:t>: list-</a:t>
+            </a:r>
+            <a:r>
+              <a:rPr lang="nl-BE" dirty="0" err="1"/>
+              <a:t>style</a:t>
+            </a:r>
+            <a:r>
+              <a:rPr lang="nl-BE" dirty="0"/>
+              <a:t>-type</a:t>
+            </a:r>
+          </a:p>
+        </p:txBody>
+      </p:sp>
+      <p:sp>
+        <p:nvSpPr>
+          <p:cNvPr id="3" name="Tijdelijke aanduiding voor inhoud 2">
+            <a:extLst>
+              <a:ext uri="{FF2B5EF4-FFF2-40B4-BE49-F238E27FC236}">
+                <a16:creationId xmlns:a16="http://schemas.microsoft.com/office/drawing/2014/main" id="{B34DA328-D237-3725-E55B-E939FAE4F1C0}"/>
+              </a:ext>
+            </a:extLst>
+          </p:cNvPr>
+          <p:cNvSpPr>
+            <a:spLocks noGrp="1"/>
+          </p:cNvSpPr>
+          <p:nvPr>
+            <p:ph idx="1"/>
+          </p:nvPr>
+        </p:nvSpPr>
+        <p:spPr/>
+        <p:txBody>
+          <a:bodyPr/>
+          <a:lstStyle/>
+          <a:p>
+            <a:r>
+              <a:rPr lang="nl-BE" dirty="0"/>
+              <a:t>Bij ongeordende lijsten kan je d.m.v. het </a:t>
+            </a:r>
+            <a:r>
+              <a:rPr lang="nl-BE" dirty="0" err="1"/>
+              <a:t>style</a:t>
+            </a:r>
+            <a:r>
+              <a:rPr lang="nl-BE" dirty="0"/>
+              <a:t>-attribuut een list-</a:t>
+            </a:r>
+            <a:r>
+              <a:rPr lang="nl-BE" dirty="0" err="1"/>
+              <a:t>style</a:t>
+            </a:r>
+            <a:r>
+              <a:rPr lang="nl-BE" dirty="0"/>
+              <a:t>-type instellen:</a:t>
+            </a:r>
+          </a:p>
+          <a:p>
+            <a:pPr lvl="1"/>
+            <a:r>
+              <a:rPr lang="nl-BE" dirty="0" err="1"/>
+              <a:t>Circle</a:t>
+            </a:r>
+            <a:endParaRPr lang="nl-BE" dirty="0"/>
+          </a:p>
+          <a:p>
+            <a:pPr lvl="1"/>
+            <a:r>
+              <a:rPr lang="nl-BE" dirty="0"/>
+              <a:t>Disc</a:t>
+            </a:r>
+          </a:p>
+          <a:p>
+            <a:pPr lvl="1"/>
+            <a:r>
+              <a:rPr lang="nl-BE" dirty="0"/>
+              <a:t>Square</a:t>
+            </a:r>
+          </a:p>
+        </p:txBody>
+      </p:sp>
+    </p:spTree>
+    <p:extLst>
+      <p:ext uri="{BB962C8B-B14F-4D97-AF65-F5344CB8AC3E}">
+        <p14:creationId xmlns:p14="http://schemas.microsoft.com/office/powerpoint/2010/main" val="1676160336"/>
+      </p:ext>
+    </p:extLst>
+  </p:cSld>
+  <p:clrMapOvr>
+    <a:masterClrMapping/>
+  </p:clrMapOvr>
+</p:sld>
+</file>
+
+<file path=ppt/slides/slide31.xml><?xml version="1.0" encoding="utf-8"?>
+<p:sld xmlns:a="http://schemas.openxmlformats.org/drawingml/2006/main" xmlns:r="http://schemas.openxmlformats.org/officeDocument/2006/relationships" xmlns:p="http://schemas.openxmlformats.org/presentationml/2006/main">
+  <p:cSld>
+    <p:spTree>
+      <p:nvGrpSpPr>
+        <p:cNvPr id="1" name=""/>
+        <p:cNvGrpSpPr/>
+        <p:nvPr/>
+      </p:nvGrpSpPr>
+      <p:grpSpPr>
+        <a:xfrm>
+          <a:off x="0" y="0"/>
+          <a:ext cx="0" cy="0"/>
+          <a:chOff x="0" y="0"/>
+          <a:chExt cx="0" cy="0"/>
+        </a:xfrm>
+      </p:grpSpPr>
+      <p:sp>
+        <p:nvSpPr>
+          <p:cNvPr id="2" name="Titel 1">
+            <a:extLst>
+              <a:ext uri="{FF2B5EF4-FFF2-40B4-BE49-F238E27FC236}">
                 <a16:creationId xmlns:a16="http://schemas.microsoft.com/office/drawing/2014/main" id="{D0697007-FBAE-28B3-ED0E-92C4F4B9F464}"/>
               </a:ext>
             </a:extLst>
@@ -10977,7 +11936,7 @@
             <a:pPr rtl="0"/>
             <a:fld id="{66D3D282-C61A-41D7-9714-7814FA67361E}" type="datetime1">
               <a:rPr lang="nl-NL" smtClean="0"/>
-              <a:t>28-11-2025</a:t>
+              <a:t>7-1-2026</a:t>
             </a:fld>
             <a:endParaRPr lang="en-US" dirty="0"/>
           </a:p>
@@ -10996,7 +11955,7 @@
 </p:sld>
 </file>
 
-<file path=ppt/slides/slide31.xml><?xml version="1.0" encoding="utf-8"?>
+<file path=ppt/slides/slide32.xml><?xml version="1.0" encoding="utf-8"?>
 <p:sld xmlns:a="http://schemas.openxmlformats.org/drawingml/2006/main" xmlns:r="http://schemas.openxmlformats.org/officeDocument/2006/relationships" xmlns:p="http://schemas.openxmlformats.org/presentationml/2006/main">
   <p:cSld>
     <p:spTree>
@@ -11138,7 +12097,7 @@
 </p:sld>
 </file>
 
-<file path=ppt/slides/slide32.xml><?xml version="1.0" encoding="utf-8"?>
+<file path=ppt/slides/slide33.xml><?xml version="1.0" encoding="utf-8"?>
 <p:sld xmlns:a="http://schemas.openxmlformats.org/drawingml/2006/main" xmlns:r="http://schemas.openxmlformats.org/officeDocument/2006/relationships" xmlns:p="http://schemas.openxmlformats.org/presentationml/2006/main">
   <p:cSld>
     <p:spTree>
@@ -11254,7 +12213,7 @@
 </p:sld>
 </file>
 
-<file path=ppt/slides/slide33.xml><?xml version="1.0" encoding="utf-8"?>
+<file path=ppt/slides/slide34.xml><?xml version="1.0" encoding="utf-8"?>
 <p:sld xmlns:a="http://schemas.openxmlformats.org/drawingml/2006/main" xmlns:r="http://schemas.openxmlformats.org/officeDocument/2006/relationships" xmlns:p="http://schemas.openxmlformats.org/presentationml/2006/main">
   <p:cSld>
     <p:spTree>
@@ -11588,7 +12547,7 @@
 </p:sld>
 </file>
 
-<file path=ppt/slides/slide34.xml><?xml version="1.0" encoding="utf-8"?>
+<file path=ppt/slides/slide35.xml><?xml version="1.0" encoding="utf-8"?>
 <p:sld xmlns:a="http://schemas.openxmlformats.org/drawingml/2006/main" xmlns:r="http://schemas.openxmlformats.org/officeDocument/2006/relationships" xmlns:p="http://schemas.openxmlformats.org/presentationml/2006/main">
   <p:cSld>
     <p:spTree>
@@ -14689,7 +15648,7 @@
 </p:sld>
 </file>
 
-<file path=ppt/slides/slide35.xml><?xml version="1.0" encoding="utf-8"?>
+<file path=ppt/slides/slide36.xml><?xml version="1.0" encoding="utf-8"?>
 <p:sld xmlns:a="http://schemas.openxmlformats.org/drawingml/2006/main" xmlns:r="http://schemas.openxmlformats.org/officeDocument/2006/relationships" xmlns:p="http://schemas.openxmlformats.org/presentationml/2006/main">
   <p:cSld>
     <p:spTree>
@@ -14949,157 +15908,6 @@
     <p:extLst>
       <p:ext uri="{BB962C8B-B14F-4D97-AF65-F5344CB8AC3E}">
         <p14:creationId xmlns:p14="http://schemas.microsoft.com/office/powerpoint/2010/main" val="3466630859"/>
-      </p:ext>
-    </p:extLst>
-  </p:cSld>
-  <p:clrMapOvr>
-    <a:masterClrMapping/>
-  </p:clrMapOvr>
-</p:sld>
-</file>
-
-<file path=ppt/slides/slide36.xml><?xml version="1.0" encoding="utf-8"?>
-<p:sld xmlns:a="http://schemas.openxmlformats.org/drawingml/2006/main" xmlns:r="http://schemas.openxmlformats.org/officeDocument/2006/relationships" xmlns:p="http://schemas.openxmlformats.org/presentationml/2006/main">
-  <p:cSld>
-    <p:spTree>
-      <p:nvGrpSpPr>
-        <p:cNvPr id="1" name="">
-          <a:extLst>
-            <a:ext uri="{FF2B5EF4-FFF2-40B4-BE49-F238E27FC236}">
-              <a16:creationId xmlns:a16="http://schemas.microsoft.com/office/drawing/2014/main" id="{C6064CD0-11EA-4B65-8D5E-C0F8F93761E5}"/>
-            </a:ext>
-          </a:extLst>
-        </p:cNvPr>
-        <p:cNvGrpSpPr/>
-        <p:nvPr/>
-      </p:nvGrpSpPr>
-      <p:grpSpPr>
-        <a:xfrm>
-          <a:off x="0" y="0"/>
-          <a:ext cx="0" cy="0"/>
-          <a:chOff x="0" y="0"/>
-          <a:chExt cx="0" cy="0"/>
-        </a:xfrm>
-      </p:grpSpPr>
-      <p:sp>
-        <p:nvSpPr>
-          <p:cNvPr id="2" name="Titel 1">
-            <a:extLst>
-              <a:ext uri="{FF2B5EF4-FFF2-40B4-BE49-F238E27FC236}">
-                <a16:creationId xmlns:a16="http://schemas.microsoft.com/office/drawing/2014/main" id="{EE97D044-1506-7668-1ACE-B541FF5361FD}"/>
-              </a:ext>
-            </a:extLst>
-          </p:cNvPr>
-          <p:cNvSpPr>
-            <a:spLocks noGrp="1"/>
-          </p:cNvSpPr>
-          <p:nvPr>
-            <p:ph type="title"/>
-          </p:nvPr>
-        </p:nvSpPr>
-        <p:spPr/>
-        <p:txBody>
-          <a:bodyPr/>
-          <a:lstStyle/>
-          <a:p>
-            <a:r>
-              <a:rPr lang="nl-BE" dirty="0"/>
-              <a:t>eigenschappen: Display</a:t>
-            </a:r>
-          </a:p>
-        </p:txBody>
-      </p:sp>
-      <p:sp>
-        <p:nvSpPr>
-          <p:cNvPr id="3" name="Tijdelijke aanduiding voor inhoud 2">
-            <a:extLst>
-              <a:ext uri="{FF2B5EF4-FFF2-40B4-BE49-F238E27FC236}">
-                <a16:creationId xmlns:a16="http://schemas.microsoft.com/office/drawing/2014/main" id="{E57CB285-4E52-D8FC-8EF9-A7D1133C8F68}"/>
-              </a:ext>
-            </a:extLst>
-          </p:cNvPr>
-          <p:cNvSpPr>
-            <a:spLocks noGrp="1"/>
-          </p:cNvSpPr>
-          <p:nvPr>
-            <p:ph idx="1"/>
-          </p:nvPr>
-        </p:nvSpPr>
-        <p:spPr/>
-        <p:txBody>
-          <a:bodyPr/>
-          <a:lstStyle/>
-          <a:p>
-            <a:r>
-              <a:rPr lang="nl-BE" dirty="0"/>
-              <a:t>Bepaalt hoe een element wordt getoond, en dus ook hoe je hier bepaalde eigenschappen (zoals </a:t>
-            </a:r>
-            <a:r>
-              <a:rPr lang="nl-BE" dirty="0" err="1"/>
-              <a:t>margin</a:t>
-            </a:r>
-            <a:r>
-              <a:rPr lang="nl-BE" dirty="0"/>
-              <a:t>: auto) op kan toepassen.</a:t>
-            </a:r>
-          </a:p>
-          <a:p>
-            <a:r>
-              <a:rPr lang="nl-BE" dirty="0"/>
-              <a:t>Waarde:</a:t>
-            </a:r>
-          </a:p>
-          <a:p>
-            <a:pPr lvl="1"/>
-            <a:r>
-              <a:rPr lang="nl-BE" dirty="0" err="1"/>
-              <a:t>Inline</a:t>
-            </a:r>
-            <a:r>
-              <a:rPr lang="nl-BE" dirty="0"/>
-              <a:t>: zoals een &lt;span&gt;, dus </a:t>
-            </a:r>
-            <a:r>
-              <a:rPr lang="nl-BE" i="1" dirty="0"/>
-              <a:t>in </a:t>
-            </a:r>
-            <a:r>
-              <a:rPr lang="nl-BE" dirty="0"/>
-              <a:t>een </a:t>
-            </a:r>
-            <a:r>
-              <a:rPr lang="nl-BE" i="1" dirty="0"/>
-              <a:t>line</a:t>
-            </a:r>
-            <a:r>
-              <a:rPr lang="nl-BE" dirty="0"/>
-              <a:t> met andere elementen.</a:t>
-            </a:r>
-          </a:p>
-          <a:p>
-            <a:pPr lvl="1"/>
-            <a:r>
-              <a:rPr lang="nl-BE" dirty="0"/>
-              <a:t>Block: zoals een &lt;p&gt;, dus als een aparte block</a:t>
-            </a:r>
-          </a:p>
-          <a:p>
-            <a:pPr lvl="1"/>
-            <a:r>
-              <a:rPr lang="nl-BE" dirty="0" err="1"/>
-              <a:t>Inherit</a:t>
-            </a:r>
-            <a:r>
-              <a:rPr lang="nl-BE" dirty="0"/>
-              <a:t>: neemt over van bovenliggend element</a:t>
-            </a:r>
-          </a:p>
-        </p:txBody>
-      </p:sp>
-    </p:spTree>
-    <p:extLst>
-      <p:ext uri="{BB962C8B-B14F-4D97-AF65-F5344CB8AC3E}">
-        <p14:creationId xmlns:p14="http://schemas.microsoft.com/office/powerpoint/2010/main" val="1178364668"/>
       </p:ext>
     </p:extLst>
   </p:cSld>
@@ -15155,7 +15963,7 @@
           <a:p>
             <a:r>
               <a:rPr lang="nl-BE" dirty="0"/>
-              <a:t>eigenschappen: Kleuren</a:t>
+              <a:t>eigenschappen: Display</a:t>
             </a:r>
           </a:p>
         </p:txBody>
@@ -15183,6 +15991,157 @@
           <a:p>
             <a:r>
               <a:rPr lang="nl-BE" dirty="0"/>
+              <a:t>Bepaalt hoe een element wordt getoond, en dus ook hoe je hier bepaalde eigenschappen (zoals </a:t>
+            </a:r>
+            <a:r>
+              <a:rPr lang="nl-BE" dirty="0" err="1"/>
+              <a:t>margin</a:t>
+            </a:r>
+            <a:r>
+              <a:rPr lang="nl-BE" dirty="0"/>
+              <a:t>: auto) op kan toepassen.</a:t>
+            </a:r>
+          </a:p>
+          <a:p>
+            <a:r>
+              <a:rPr lang="nl-BE" dirty="0"/>
+              <a:t>Waarde:</a:t>
+            </a:r>
+          </a:p>
+          <a:p>
+            <a:pPr lvl="1"/>
+            <a:r>
+              <a:rPr lang="nl-BE" dirty="0" err="1"/>
+              <a:t>Inline</a:t>
+            </a:r>
+            <a:r>
+              <a:rPr lang="nl-BE" dirty="0"/>
+              <a:t>: zoals een &lt;span&gt;, dus </a:t>
+            </a:r>
+            <a:r>
+              <a:rPr lang="nl-BE" i="1" dirty="0"/>
+              <a:t>in </a:t>
+            </a:r>
+            <a:r>
+              <a:rPr lang="nl-BE" dirty="0"/>
+              <a:t>een </a:t>
+            </a:r>
+            <a:r>
+              <a:rPr lang="nl-BE" i="1" dirty="0"/>
+              <a:t>line</a:t>
+            </a:r>
+            <a:r>
+              <a:rPr lang="nl-BE" dirty="0"/>
+              <a:t> met andere elementen.</a:t>
+            </a:r>
+          </a:p>
+          <a:p>
+            <a:pPr lvl="1"/>
+            <a:r>
+              <a:rPr lang="nl-BE" dirty="0"/>
+              <a:t>Block: zoals een &lt;p&gt;, dus als een aparte block</a:t>
+            </a:r>
+          </a:p>
+          <a:p>
+            <a:pPr lvl="1"/>
+            <a:r>
+              <a:rPr lang="nl-BE" dirty="0" err="1"/>
+              <a:t>Inherit</a:t>
+            </a:r>
+            <a:r>
+              <a:rPr lang="nl-BE" dirty="0"/>
+              <a:t>: neemt over van bovenliggend element</a:t>
+            </a:r>
+          </a:p>
+        </p:txBody>
+      </p:sp>
+    </p:spTree>
+    <p:extLst>
+      <p:ext uri="{BB962C8B-B14F-4D97-AF65-F5344CB8AC3E}">
+        <p14:creationId xmlns:p14="http://schemas.microsoft.com/office/powerpoint/2010/main" val="1178364668"/>
+      </p:ext>
+    </p:extLst>
+  </p:cSld>
+  <p:clrMapOvr>
+    <a:masterClrMapping/>
+  </p:clrMapOvr>
+</p:sld>
+</file>
+
+<file path=ppt/slides/slide38.xml><?xml version="1.0" encoding="utf-8"?>
+<p:sld xmlns:a="http://schemas.openxmlformats.org/drawingml/2006/main" xmlns:r="http://schemas.openxmlformats.org/officeDocument/2006/relationships" xmlns:p="http://schemas.openxmlformats.org/presentationml/2006/main">
+  <p:cSld>
+    <p:spTree>
+      <p:nvGrpSpPr>
+        <p:cNvPr id="1" name="">
+          <a:extLst>
+            <a:ext uri="{FF2B5EF4-FFF2-40B4-BE49-F238E27FC236}">
+              <a16:creationId xmlns:a16="http://schemas.microsoft.com/office/drawing/2014/main" id="{C6064CD0-11EA-4B65-8D5E-C0F8F93761E5}"/>
+            </a:ext>
+          </a:extLst>
+        </p:cNvPr>
+        <p:cNvGrpSpPr/>
+        <p:nvPr/>
+      </p:nvGrpSpPr>
+      <p:grpSpPr>
+        <a:xfrm>
+          <a:off x="0" y="0"/>
+          <a:ext cx="0" cy="0"/>
+          <a:chOff x="0" y="0"/>
+          <a:chExt cx="0" cy="0"/>
+        </a:xfrm>
+      </p:grpSpPr>
+      <p:sp>
+        <p:nvSpPr>
+          <p:cNvPr id="2" name="Titel 1">
+            <a:extLst>
+              <a:ext uri="{FF2B5EF4-FFF2-40B4-BE49-F238E27FC236}">
+                <a16:creationId xmlns:a16="http://schemas.microsoft.com/office/drawing/2014/main" id="{EE97D044-1506-7668-1ACE-B541FF5361FD}"/>
+              </a:ext>
+            </a:extLst>
+          </p:cNvPr>
+          <p:cNvSpPr>
+            <a:spLocks noGrp="1"/>
+          </p:cNvSpPr>
+          <p:nvPr>
+            <p:ph type="title"/>
+          </p:nvPr>
+        </p:nvSpPr>
+        <p:spPr/>
+        <p:txBody>
+          <a:bodyPr/>
+          <a:lstStyle/>
+          <a:p>
+            <a:r>
+              <a:rPr lang="nl-BE" dirty="0"/>
+              <a:t>eigenschappen: Kleuren</a:t>
+            </a:r>
+          </a:p>
+        </p:txBody>
+      </p:sp>
+      <p:sp>
+        <p:nvSpPr>
+          <p:cNvPr id="3" name="Tijdelijke aanduiding voor inhoud 2">
+            <a:extLst>
+              <a:ext uri="{FF2B5EF4-FFF2-40B4-BE49-F238E27FC236}">
+                <a16:creationId xmlns:a16="http://schemas.microsoft.com/office/drawing/2014/main" id="{E57CB285-4E52-D8FC-8EF9-A7D1133C8F68}"/>
+              </a:ext>
+            </a:extLst>
+          </p:cNvPr>
+          <p:cNvSpPr>
+            <a:spLocks noGrp="1"/>
+          </p:cNvSpPr>
+          <p:nvPr>
+            <p:ph idx="1"/>
+          </p:nvPr>
+        </p:nvSpPr>
+        <p:spPr/>
+        <p:txBody>
+          <a:bodyPr/>
+          <a:lstStyle/>
+          <a:p>
+            <a:r>
+              <a:rPr lang="nl-BE" dirty="0"/>
               <a:t>Vooraf gedefinieerde kleuren: black, green, red, </a:t>
             </a:r>
             <a:r>
@@ -15341,7 +16300,7 @@
 </p:sld>
 </file>
 
-<file path=ppt/slides/slide38.xml><?xml version="1.0" encoding="utf-8"?>
+<file path=ppt/slides/slide39.xml><?xml version="1.0" encoding="utf-8"?>
 <p:sld xmlns:a="http://schemas.openxmlformats.org/drawingml/2006/main" xmlns:r="http://schemas.openxmlformats.org/officeDocument/2006/relationships" xmlns:p="http://schemas.openxmlformats.org/presentationml/2006/main">
   <p:cSld>
     <p:spTree>
@@ -15559,241 +16518,6 @@
     <p:extLst>
       <p:ext uri="{BB962C8B-B14F-4D97-AF65-F5344CB8AC3E}">
         <p14:creationId xmlns:p14="http://schemas.microsoft.com/office/powerpoint/2010/main" val="2529747929"/>
-      </p:ext>
-    </p:extLst>
-  </p:cSld>
-  <p:clrMapOvr>
-    <a:masterClrMapping/>
-  </p:clrMapOvr>
-</p:sld>
-</file>
-
-<file path=ppt/slides/slide39.xml><?xml version="1.0" encoding="utf-8"?>
-<p:sld xmlns:a="http://schemas.openxmlformats.org/drawingml/2006/main" xmlns:r="http://schemas.openxmlformats.org/officeDocument/2006/relationships" xmlns:p="http://schemas.openxmlformats.org/presentationml/2006/main">
-  <p:cSld>
-    <p:spTree>
-      <p:nvGrpSpPr>
-        <p:cNvPr id="1" name="">
-          <a:extLst>
-            <a:ext uri="{FF2B5EF4-FFF2-40B4-BE49-F238E27FC236}">
-              <a16:creationId xmlns:a16="http://schemas.microsoft.com/office/drawing/2014/main" id="{1B44CDDF-36A5-3594-50CD-8A764085421C}"/>
-            </a:ext>
-          </a:extLst>
-        </p:cNvPr>
-        <p:cNvGrpSpPr/>
-        <p:nvPr/>
-      </p:nvGrpSpPr>
-      <p:grpSpPr>
-        <a:xfrm>
-          <a:off x="0" y="0"/>
-          <a:ext cx="0" cy="0"/>
-          <a:chOff x="0" y="0"/>
-          <a:chExt cx="0" cy="0"/>
-        </a:xfrm>
-      </p:grpSpPr>
-      <p:sp>
-        <p:nvSpPr>
-          <p:cNvPr id="2" name="Titel 1">
-            <a:extLst>
-              <a:ext uri="{FF2B5EF4-FFF2-40B4-BE49-F238E27FC236}">
-                <a16:creationId xmlns:a16="http://schemas.microsoft.com/office/drawing/2014/main" id="{88CD223F-D39A-137D-7ABA-5F7FAA27B5C4}"/>
-              </a:ext>
-            </a:extLst>
-          </p:cNvPr>
-          <p:cNvSpPr>
-            <a:spLocks noGrp="1"/>
-          </p:cNvSpPr>
-          <p:nvPr>
-            <p:ph type="title"/>
-          </p:nvPr>
-        </p:nvSpPr>
-        <p:spPr/>
-        <p:txBody>
-          <a:bodyPr/>
-          <a:lstStyle/>
-          <a:p>
-            <a:r>
-              <a:rPr lang="nl-BE" dirty="0"/>
-              <a:t>eigenschappen: afstanden</a:t>
-            </a:r>
-          </a:p>
-        </p:txBody>
-      </p:sp>
-      <p:sp>
-        <p:nvSpPr>
-          <p:cNvPr id="3" name="Tijdelijke aanduiding voor inhoud 2">
-            <a:extLst>
-              <a:ext uri="{FF2B5EF4-FFF2-40B4-BE49-F238E27FC236}">
-                <a16:creationId xmlns:a16="http://schemas.microsoft.com/office/drawing/2014/main" id="{D10F50C6-B7E2-B3F9-A3C6-6CCF9DE77139}"/>
-              </a:ext>
-            </a:extLst>
-          </p:cNvPr>
-          <p:cNvSpPr>
-            <a:spLocks noGrp="1"/>
-          </p:cNvSpPr>
-          <p:nvPr>
-            <p:ph idx="1"/>
-          </p:nvPr>
-        </p:nvSpPr>
-        <p:spPr>
-          <a:xfrm>
-            <a:off x="581192" y="2340863"/>
-            <a:ext cx="11029615" cy="4347803"/>
-          </a:xfrm>
-        </p:spPr>
-        <p:txBody>
-          <a:bodyPr/>
-          <a:lstStyle/>
-          <a:p>
-            <a:r>
-              <a:rPr lang="nl-BE" dirty="0" err="1"/>
-              <a:t>Width</a:t>
-            </a:r>
-            <a:r>
-              <a:rPr lang="nl-BE" dirty="0"/>
-              <a:t>/</a:t>
-            </a:r>
-            <a:r>
-              <a:rPr lang="nl-BE" dirty="0" err="1"/>
-              <a:t>Height</a:t>
-            </a:r>
-            <a:r>
-              <a:rPr lang="nl-BE" dirty="0"/>
-              <a:t>:</a:t>
-            </a:r>
-          </a:p>
-          <a:p>
-            <a:pPr lvl="1"/>
-            <a:r>
-              <a:rPr lang="nl-BE" dirty="0"/>
-              <a:t>auto</a:t>
-            </a:r>
-          </a:p>
-          <a:p>
-            <a:pPr lvl="1"/>
-            <a:r>
-              <a:rPr lang="nl-BE" dirty="0" err="1"/>
-              <a:t>initial</a:t>
-            </a:r>
-            <a:r>
-              <a:rPr lang="nl-BE" dirty="0"/>
-              <a:t> (</a:t>
-            </a:r>
-            <a:r>
-              <a:rPr lang="nl-BE" dirty="0" err="1"/>
-              <a:t>initaliseren</a:t>
-            </a:r>
-            <a:r>
-              <a:rPr lang="nl-BE" dirty="0"/>
-              <a:t>)</a:t>
-            </a:r>
-          </a:p>
-          <a:p>
-            <a:pPr lvl="1"/>
-            <a:r>
-              <a:rPr lang="nl-BE" dirty="0" err="1"/>
-              <a:t>inherit</a:t>
-            </a:r>
-            <a:r>
-              <a:rPr lang="nl-BE" dirty="0"/>
-              <a:t>: overnemen van </a:t>
-            </a:r>
-            <a:r>
-              <a:rPr lang="nl-BE" dirty="0" err="1"/>
-              <a:t>parent</a:t>
-            </a:r>
-            <a:r>
-              <a:rPr lang="nl-BE" dirty="0"/>
-              <a:t>-element</a:t>
-            </a:r>
-          </a:p>
-          <a:p>
-            <a:pPr lvl="1"/>
-            <a:r>
-              <a:rPr lang="nl-BE" dirty="0" err="1"/>
-              <a:t>length</a:t>
-            </a:r>
-            <a:r>
-              <a:rPr lang="nl-BE" dirty="0"/>
-              <a:t> (vaste waarde): </a:t>
-            </a:r>
-            <a:r>
-              <a:rPr lang="nl-BE" dirty="0" err="1"/>
-              <a:t>px</a:t>
-            </a:r>
-            <a:r>
-              <a:rPr lang="nl-BE" dirty="0"/>
-              <a:t>, cm, …</a:t>
-            </a:r>
-          </a:p>
-          <a:p>
-            <a:pPr lvl="1"/>
-            <a:r>
-              <a:rPr lang="nl-BE" dirty="0"/>
-              <a:t>%: op basis van hoogte/breedte van </a:t>
-            </a:r>
-            <a:r>
-              <a:rPr lang="nl-BE" dirty="0" err="1"/>
-              <a:t>parent</a:t>
-            </a:r>
-            <a:r>
-              <a:rPr lang="nl-BE" dirty="0"/>
-              <a:t>-element</a:t>
-            </a:r>
-          </a:p>
-        </p:txBody>
-      </p:sp>
-      <p:pic>
-        <p:nvPicPr>
-          <p:cNvPr id="1026" name="Picture 2" descr="The Box Model: Padding, Border, Margin: CSS Tutorial">
-            <a:extLst>
-              <a:ext uri="{FF2B5EF4-FFF2-40B4-BE49-F238E27FC236}">
-                <a16:creationId xmlns:a16="http://schemas.microsoft.com/office/drawing/2014/main" id="{B65B57D4-1FA3-9F76-D61A-40F5901EDCBB}"/>
-              </a:ext>
-            </a:extLst>
-          </p:cNvPr>
-          <p:cNvPicPr>
-            <a:picLocks noChangeAspect="1" noChangeArrowheads="1"/>
-          </p:cNvPicPr>
-          <p:nvPr/>
-        </p:nvPicPr>
-        <p:blipFill>
-          <a:blip r:embed="rId2">
-            <a:extLst>
-              <a:ext uri="{28A0092B-C50C-407E-A947-70E740481C1C}">
-                <a14:useLocalDpi xmlns:a14="http://schemas.microsoft.com/office/drawing/2010/main" val="0"/>
-              </a:ext>
-            </a:extLst>
-          </a:blip>
-          <a:srcRect/>
-          <a:stretch>
-            <a:fillRect/>
-          </a:stretch>
-        </p:blipFill>
-        <p:spPr bwMode="auto">
-          <a:xfrm>
-            <a:off x="7047287" y="2395335"/>
-            <a:ext cx="4563520" cy="3525543"/>
-          </a:xfrm>
-          <a:prstGeom prst="rect">
-            <a:avLst/>
-          </a:prstGeom>
-          <a:noFill/>
-          <a:extLst>
-            <a:ext uri="{909E8E84-426E-40DD-AFC4-6F175D3DCCD1}">
-              <a14:hiddenFill xmlns:a14="http://schemas.microsoft.com/office/drawing/2010/main">
-                <a:solidFill>
-                  <a:srgbClr val="FFFFFF"/>
-                </a:solidFill>
-              </a14:hiddenFill>
-            </a:ext>
-          </a:extLst>
-        </p:spPr>
-      </p:pic>
-    </p:spTree>
-    <p:extLst>
-      <p:ext uri="{BB962C8B-B14F-4D97-AF65-F5344CB8AC3E}">
-        <p14:creationId xmlns:p14="http://schemas.microsoft.com/office/powerpoint/2010/main" val="4022230308"/>
       </p:ext>
     </p:extLst>
   </p:cSld>
@@ -16024,6 +16748,241 @@
         <p:cNvPr id="1" name="">
           <a:extLst>
             <a:ext uri="{FF2B5EF4-FFF2-40B4-BE49-F238E27FC236}">
+              <a16:creationId xmlns:a16="http://schemas.microsoft.com/office/drawing/2014/main" id="{1B44CDDF-36A5-3594-50CD-8A764085421C}"/>
+            </a:ext>
+          </a:extLst>
+        </p:cNvPr>
+        <p:cNvGrpSpPr/>
+        <p:nvPr/>
+      </p:nvGrpSpPr>
+      <p:grpSpPr>
+        <a:xfrm>
+          <a:off x="0" y="0"/>
+          <a:ext cx="0" cy="0"/>
+          <a:chOff x="0" y="0"/>
+          <a:chExt cx="0" cy="0"/>
+        </a:xfrm>
+      </p:grpSpPr>
+      <p:sp>
+        <p:nvSpPr>
+          <p:cNvPr id="2" name="Titel 1">
+            <a:extLst>
+              <a:ext uri="{FF2B5EF4-FFF2-40B4-BE49-F238E27FC236}">
+                <a16:creationId xmlns:a16="http://schemas.microsoft.com/office/drawing/2014/main" id="{88CD223F-D39A-137D-7ABA-5F7FAA27B5C4}"/>
+              </a:ext>
+            </a:extLst>
+          </p:cNvPr>
+          <p:cNvSpPr>
+            <a:spLocks noGrp="1"/>
+          </p:cNvSpPr>
+          <p:nvPr>
+            <p:ph type="title"/>
+          </p:nvPr>
+        </p:nvSpPr>
+        <p:spPr/>
+        <p:txBody>
+          <a:bodyPr/>
+          <a:lstStyle/>
+          <a:p>
+            <a:r>
+              <a:rPr lang="nl-BE" dirty="0"/>
+              <a:t>eigenschappen: afstanden</a:t>
+            </a:r>
+          </a:p>
+        </p:txBody>
+      </p:sp>
+      <p:sp>
+        <p:nvSpPr>
+          <p:cNvPr id="3" name="Tijdelijke aanduiding voor inhoud 2">
+            <a:extLst>
+              <a:ext uri="{FF2B5EF4-FFF2-40B4-BE49-F238E27FC236}">
+                <a16:creationId xmlns:a16="http://schemas.microsoft.com/office/drawing/2014/main" id="{D10F50C6-B7E2-B3F9-A3C6-6CCF9DE77139}"/>
+              </a:ext>
+            </a:extLst>
+          </p:cNvPr>
+          <p:cNvSpPr>
+            <a:spLocks noGrp="1"/>
+          </p:cNvSpPr>
+          <p:nvPr>
+            <p:ph idx="1"/>
+          </p:nvPr>
+        </p:nvSpPr>
+        <p:spPr>
+          <a:xfrm>
+            <a:off x="581192" y="2340863"/>
+            <a:ext cx="11029615" cy="4347803"/>
+          </a:xfrm>
+        </p:spPr>
+        <p:txBody>
+          <a:bodyPr/>
+          <a:lstStyle/>
+          <a:p>
+            <a:r>
+              <a:rPr lang="nl-BE" dirty="0" err="1"/>
+              <a:t>Width</a:t>
+            </a:r>
+            <a:r>
+              <a:rPr lang="nl-BE" dirty="0"/>
+              <a:t>/</a:t>
+            </a:r>
+            <a:r>
+              <a:rPr lang="nl-BE" dirty="0" err="1"/>
+              <a:t>Height</a:t>
+            </a:r>
+            <a:r>
+              <a:rPr lang="nl-BE" dirty="0"/>
+              <a:t>:</a:t>
+            </a:r>
+          </a:p>
+          <a:p>
+            <a:pPr lvl="1"/>
+            <a:r>
+              <a:rPr lang="nl-BE" dirty="0"/>
+              <a:t>auto</a:t>
+            </a:r>
+          </a:p>
+          <a:p>
+            <a:pPr lvl="1"/>
+            <a:r>
+              <a:rPr lang="nl-BE" dirty="0" err="1"/>
+              <a:t>initial</a:t>
+            </a:r>
+            <a:r>
+              <a:rPr lang="nl-BE" dirty="0"/>
+              <a:t> (</a:t>
+            </a:r>
+            <a:r>
+              <a:rPr lang="nl-BE" dirty="0" err="1"/>
+              <a:t>initaliseren</a:t>
+            </a:r>
+            <a:r>
+              <a:rPr lang="nl-BE" dirty="0"/>
+              <a:t>)</a:t>
+            </a:r>
+          </a:p>
+          <a:p>
+            <a:pPr lvl="1"/>
+            <a:r>
+              <a:rPr lang="nl-BE" dirty="0" err="1"/>
+              <a:t>inherit</a:t>
+            </a:r>
+            <a:r>
+              <a:rPr lang="nl-BE" dirty="0"/>
+              <a:t>: overnemen van </a:t>
+            </a:r>
+            <a:r>
+              <a:rPr lang="nl-BE" dirty="0" err="1"/>
+              <a:t>parent</a:t>
+            </a:r>
+            <a:r>
+              <a:rPr lang="nl-BE" dirty="0"/>
+              <a:t>-element</a:t>
+            </a:r>
+          </a:p>
+          <a:p>
+            <a:pPr lvl="1"/>
+            <a:r>
+              <a:rPr lang="nl-BE" dirty="0" err="1"/>
+              <a:t>length</a:t>
+            </a:r>
+            <a:r>
+              <a:rPr lang="nl-BE" dirty="0"/>
+              <a:t> (vaste waarde): </a:t>
+            </a:r>
+            <a:r>
+              <a:rPr lang="nl-BE" dirty="0" err="1"/>
+              <a:t>px</a:t>
+            </a:r>
+            <a:r>
+              <a:rPr lang="nl-BE" dirty="0"/>
+              <a:t>, cm, …</a:t>
+            </a:r>
+          </a:p>
+          <a:p>
+            <a:pPr lvl="1"/>
+            <a:r>
+              <a:rPr lang="nl-BE" dirty="0"/>
+              <a:t>%: op basis van hoogte/breedte van </a:t>
+            </a:r>
+            <a:r>
+              <a:rPr lang="nl-BE" dirty="0" err="1"/>
+              <a:t>parent</a:t>
+            </a:r>
+            <a:r>
+              <a:rPr lang="nl-BE" dirty="0"/>
+              <a:t>-element</a:t>
+            </a:r>
+          </a:p>
+        </p:txBody>
+      </p:sp>
+      <p:pic>
+        <p:nvPicPr>
+          <p:cNvPr id="1026" name="Picture 2" descr="The Box Model: Padding, Border, Margin: CSS Tutorial">
+            <a:extLst>
+              <a:ext uri="{FF2B5EF4-FFF2-40B4-BE49-F238E27FC236}">
+                <a16:creationId xmlns:a16="http://schemas.microsoft.com/office/drawing/2014/main" id="{B65B57D4-1FA3-9F76-D61A-40F5901EDCBB}"/>
+              </a:ext>
+            </a:extLst>
+          </p:cNvPr>
+          <p:cNvPicPr>
+            <a:picLocks noChangeAspect="1" noChangeArrowheads="1"/>
+          </p:cNvPicPr>
+          <p:nvPr/>
+        </p:nvPicPr>
+        <p:blipFill>
+          <a:blip r:embed="rId2">
+            <a:extLst>
+              <a:ext uri="{28A0092B-C50C-407E-A947-70E740481C1C}">
+                <a14:useLocalDpi xmlns:a14="http://schemas.microsoft.com/office/drawing/2010/main" val="0"/>
+              </a:ext>
+            </a:extLst>
+          </a:blip>
+          <a:srcRect/>
+          <a:stretch>
+            <a:fillRect/>
+          </a:stretch>
+        </p:blipFill>
+        <p:spPr bwMode="auto">
+          <a:xfrm>
+            <a:off x="7047287" y="2395335"/>
+            <a:ext cx="4563520" cy="3525543"/>
+          </a:xfrm>
+          <a:prstGeom prst="rect">
+            <a:avLst/>
+          </a:prstGeom>
+          <a:noFill/>
+          <a:extLst>
+            <a:ext uri="{909E8E84-426E-40DD-AFC4-6F175D3DCCD1}">
+              <a14:hiddenFill xmlns:a14="http://schemas.microsoft.com/office/drawing/2010/main">
+                <a:solidFill>
+                  <a:srgbClr val="FFFFFF"/>
+                </a:solidFill>
+              </a14:hiddenFill>
+            </a:ext>
+          </a:extLst>
+        </p:spPr>
+      </p:pic>
+    </p:spTree>
+    <p:extLst>
+      <p:ext uri="{BB962C8B-B14F-4D97-AF65-F5344CB8AC3E}">
+        <p14:creationId xmlns:p14="http://schemas.microsoft.com/office/powerpoint/2010/main" val="4022230308"/>
+      </p:ext>
+    </p:extLst>
+  </p:cSld>
+  <p:clrMapOvr>
+    <a:masterClrMapping/>
+  </p:clrMapOvr>
+</p:sld>
+</file>
+
+<file path=ppt/slides/slide41.xml><?xml version="1.0" encoding="utf-8"?>
+<p:sld xmlns:a="http://schemas.openxmlformats.org/drawingml/2006/main" xmlns:r="http://schemas.openxmlformats.org/officeDocument/2006/relationships" xmlns:p="http://schemas.openxmlformats.org/presentationml/2006/main">
+  <p:cSld>
+    <p:spTree>
+      <p:nvGrpSpPr>
+        <p:cNvPr id="1" name="">
+          <a:extLst>
+            <a:ext uri="{FF2B5EF4-FFF2-40B4-BE49-F238E27FC236}">
               <a16:creationId xmlns:a16="http://schemas.microsoft.com/office/drawing/2014/main" id="{4557281D-A62B-3423-46C8-44D7B01B3A59}"/>
             </a:ext>
           </a:extLst>
@@ -16111,7 +17070,7 @@
             <a:pPr lvl="1"/>
             <a:r>
               <a:rPr lang="nl-BE" dirty="0"/>
-              <a:t>&lt;h2&gt; met je beroep of hobby</a:t>
+              <a:t>&lt;h2&gt; met je hobby of interesse</a:t>
             </a:r>
           </a:p>
           <a:p>
@@ -16250,7 +17209,7 @@
 </p:sld>
 </file>
 
-<file path=ppt/slides/slide41.xml><?xml version="1.0" encoding="utf-8"?>
+<file path=ppt/slides/slide42.xml><?xml version="1.0" encoding="utf-8"?>
 <p:sld xmlns:a="http://schemas.openxmlformats.org/drawingml/2006/main" xmlns:r="http://schemas.openxmlformats.org/officeDocument/2006/relationships" xmlns:p="http://schemas.openxmlformats.org/presentationml/2006/main">
   <p:cSld>
     <p:spTree>
@@ -16532,7 +17491,7 @@
 </p:sld>
 </file>
 
-<file path=ppt/slides/slide42.xml><?xml version="1.0" encoding="utf-8"?>
+<file path=ppt/slides/slide43.xml><?xml version="1.0" encoding="utf-8"?>
 <p:sld xmlns:a="http://schemas.openxmlformats.org/drawingml/2006/main" xmlns:r="http://schemas.openxmlformats.org/officeDocument/2006/relationships" xmlns:p="http://schemas.openxmlformats.org/presentationml/2006/main">
   <p:cSld>
     <p:spTree>
@@ -16620,7 +17579,7 @@
             <a:pPr lvl="1"/>
             <a:r>
               <a:rPr lang="nl-BE" dirty="0"/>
-              <a:t>&lt;h1&gt; titel van je winkel</a:t>
+              <a:t>&lt;h1&gt; titel van je favoriete winkel</a:t>
             </a:r>
           </a:p>
           <a:p>
@@ -16783,7 +17742,7 @@
 </p:sld>
 </file>
 
-<file path=ppt/slides/slide43.xml><?xml version="1.0" encoding="utf-8"?>
+<file path=ppt/slides/slide44.xml><?xml version="1.0" encoding="utf-8"?>
 <p:sld xmlns:a="http://schemas.openxmlformats.org/drawingml/2006/main" xmlns:r="http://schemas.openxmlformats.org/officeDocument/2006/relationships" xmlns:p="http://schemas.openxmlformats.org/presentationml/2006/main">
   <p:cSld>
     <p:spTree>
@@ -16880,7 +17839,7 @@
             <a:pPr rtl="0"/>
             <a:fld id="{66D3D282-C61A-41D7-9714-7814FA67361E}" type="datetime1">
               <a:rPr lang="nl-NL" smtClean="0"/>
-              <a:t>28-11-2025</a:t>
+              <a:t>7-1-2026</a:t>
             </a:fld>
             <a:endParaRPr lang="en-US" dirty="0"/>
           </a:p>
@@ -16899,7 +17858,7 @@
 </p:sld>
 </file>
 
-<file path=ppt/slides/slide44.xml><?xml version="1.0" encoding="utf-8"?>
+<file path=ppt/slides/slide45.xml><?xml version="1.0" encoding="utf-8"?>
 <p:sld xmlns:a="http://schemas.openxmlformats.org/drawingml/2006/main" xmlns:r="http://schemas.openxmlformats.org/officeDocument/2006/relationships" xmlns:p="http://schemas.openxmlformats.org/presentationml/2006/main">
   <p:cSld>
     <p:spTree>
@@ -17003,7 +17962,7 @@
 </p:sld>
 </file>
 
-<file path=ppt/slides/slide45.xml><?xml version="1.0" encoding="utf-8"?>
+<file path=ppt/slides/slide46.xml><?xml version="1.0" encoding="utf-8"?>
 <p:sld xmlns:a="http://schemas.openxmlformats.org/drawingml/2006/main" xmlns:r="http://schemas.openxmlformats.org/officeDocument/2006/relationships" xmlns:p="http://schemas.openxmlformats.org/presentationml/2006/main">
   <p:cSld>
     <p:spTree>
@@ -17277,7 +18236,7 @@
 </p:sld>
 </file>
 
-<file path=ppt/slides/slide46.xml><?xml version="1.0" encoding="utf-8"?>
+<file path=ppt/slides/slide47.xml><?xml version="1.0" encoding="utf-8"?>
 <p:sld xmlns:a="http://schemas.openxmlformats.org/drawingml/2006/main" xmlns:r="http://schemas.openxmlformats.org/officeDocument/2006/relationships" xmlns:p="http://schemas.openxmlformats.org/presentationml/2006/main">
   <p:cSld>
     <p:spTree>
@@ -17835,7 +18794,7 @@
 </p:sld>
 </file>
 
-<file path=ppt/slides/slide47.xml><?xml version="1.0" encoding="utf-8"?>
+<file path=ppt/slides/slide48.xml><?xml version="1.0" encoding="utf-8"?>
 <p:sld xmlns:a="http://schemas.openxmlformats.org/drawingml/2006/main" xmlns:r="http://schemas.openxmlformats.org/officeDocument/2006/relationships" xmlns:p="http://schemas.openxmlformats.org/presentationml/2006/main">
   <p:cSld>
     <p:spTree>
@@ -18101,7 +19060,7 @@
 </p:sld>
 </file>
 
-<file path=ppt/slides/slide48.xml><?xml version="1.0" encoding="utf-8"?>
+<file path=ppt/slides/slide49.xml><?xml version="1.0" encoding="utf-8"?>
 <p:sld xmlns:a="http://schemas.openxmlformats.org/drawingml/2006/main" xmlns:r="http://schemas.openxmlformats.org/officeDocument/2006/relationships" xmlns:p="http://schemas.openxmlformats.org/presentationml/2006/main">
   <p:cSld>
     <p:spTree>
@@ -18449,163 +19408,6 @@
     <p:extLst>
       <p:ext uri="{BB962C8B-B14F-4D97-AF65-F5344CB8AC3E}">
         <p14:creationId xmlns:p14="http://schemas.microsoft.com/office/powerpoint/2010/main" val="1810173470"/>
-      </p:ext>
-    </p:extLst>
-  </p:cSld>
-  <p:clrMapOvr>
-    <a:masterClrMapping/>
-  </p:clrMapOvr>
-</p:sld>
-</file>
-
-<file path=ppt/slides/slide49.xml><?xml version="1.0" encoding="utf-8"?>
-<p:sld xmlns:a="http://schemas.openxmlformats.org/drawingml/2006/main" xmlns:r="http://schemas.openxmlformats.org/officeDocument/2006/relationships" xmlns:p="http://schemas.openxmlformats.org/presentationml/2006/main">
-  <p:cSld>
-    <p:spTree>
-      <p:nvGrpSpPr>
-        <p:cNvPr id="1" name=""/>
-        <p:cNvGrpSpPr/>
-        <p:nvPr/>
-      </p:nvGrpSpPr>
-      <p:grpSpPr>
-        <a:xfrm>
-          <a:off x="0" y="0"/>
-          <a:ext cx="0" cy="0"/>
-          <a:chOff x="0" y="0"/>
-          <a:chExt cx="0" cy="0"/>
-        </a:xfrm>
-      </p:grpSpPr>
-      <p:sp>
-        <p:nvSpPr>
-          <p:cNvPr id="2" name="Titel 1">
-            <a:extLst>
-              <a:ext uri="{FF2B5EF4-FFF2-40B4-BE49-F238E27FC236}">
-                <a16:creationId xmlns:a16="http://schemas.microsoft.com/office/drawing/2014/main" id="{933D7D8F-B819-81BF-DA86-83726FAEF496}"/>
-              </a:ext>
-            </a:extLst>
-          </p:cNvPr>
-          <p:cNvSpPr>
-            <a:spLocks noGrp="1"/>
-          </p:cNvSpPr>
-          <p:nvPr>
-            <p:ph type="title"/>
-          </p:nvPr>
-        </p:nvSpPr>
-        <p:spPr/>
-        <p:txBody>
-          <a:bodyPr/>
-          <a:lstStyle/>
-          <a:p>
-            <a:r>
-              <a:rPr lang="nl-BE" dirty="0"/>
-              <a:t>document</a:t>
-            </a:r>
-          </a:p>
-        </p:txBody>
-      </p:sp>
-      <p:sp>
-        <p:nvSpPr>
-          <p:cNvPr id="3" name="Tijdelijke aanduiding voor inhoud 2">
-            <a:extLst>
-              <a:ext uri="{FF2B5EF4-FFF2-40B4-BE49-F238E27FC236}">
-                <a16:creationId xmlns:a16="http://schemas.microsoft.com/office/drawing/2014/main" id="{C823ABD3-3833-30EE-A10A-DC1C61D4913E}"/>
-              </a:ext>
-            </a:extLst>
-          </p:cNvPr>
-          <p:cNvSpPr>
-            <a:spLocks noGrp="1"/>
-          </p:cNvSpPr>
-          <p:nvPr>
-            <p:ph idx="1"/>
-          </p:nvPr>
-        </p:nvSpPr>
-        <p:spPr/>
-        <p:txBody>
-          <a:bodyPr/>
-          <a:lstStyle/>
-          <a:p>
-            <a:r>
-              <a:rPr lang="nl-BE" dirty="0"/>
-              <a:t>Is een object dat elementen op de webpagina kan vinden en aanpassen</a:t>
-            </a:r>
-          </a:p>
-          <a:p>
-            <a:r>
-              <a:rPr lang="nl-BE" dirty="0"/>
-              <a:t>Veelgebruikte functies:</a:t>
-            </a:r>
-          </a:p>
-          <a:p>
-            <a:pPr lvl="1"/>
-            <a:r>
-              <a:rPr lang="nl-BE" dirty="0" err="1"/>
-              <a:t>document.getElementById</a:t>
-            </a:r>
-            <a:r>
-              <a:rPr lang="nl-BE" dirty="0"/>
-              <a:t>(</a:t>
-            </a:r>
-            <a:r>
-              <a:rPr lang="nl-BE" dirty="0" err="1"/>
-              <a:t>id</a:t>
-            </a:r>
-            <a:r>
-              <a:rPr lang="nl-BE" dirty="0"/>
-              <a:t>): vind het eerste element met een bepaalde </a:t>
-            </a:r>
-            <a:r>
-              <a:rPr lang="nl-BE" dirty="0" err="1"/>
-              <a:t>id</a:t>
-            </a:r>
-            <a:r>
-              <a:rPr lang="nl-BE" dirty="0"/>
-              <a:t>-attribuut</a:t>
-            </a:r>
-          </a:p>
-          <a:p>
-            <a:pPr lvl="1"/>
-            <a:r>
-              <a:rPr lang="nl-BE" dirty="0" err="1"/>
-              <a:t>document.getElementsByClassName</a:t>
-            </a:r>
-            <a:r>
-              <a:rPr lang="nl-BE" dirty="0"/>
-              <a:t>(</a:t>
-            </a:r>
-            <a:r>
-              <a:rPr lang="nl-BE" i="1" dirty="0"/>
-              <a:t>name</a:t>
-            </a:r>
-            <a:r>
-              <a:rPr lang="nl-BE" dirty="0"/>
-              <a:t>): vind alle elementen die een bepaalde name als deel van hun class-attribuut hebben</a:t>
-            </a:r>
-          </a:p>
-          <a:p>
-            <a:pPr lvl="1"/>
-            <a:r>
-              <a:rPr lang="nl-BE" dirty="0" err="1"/>
-              <a:t>document.getElementsByTagName</a:t>
-            </a:r>
-            <a:r>
-              <a:rPr lang="nl-BE" dirty="0"/>
-              <a:t>(</a:t>
-            </a:r>
-            <a:r>
-              <a:rPr lang="nl-BE" i="1" dirty="0"/>
-              <a:t>name</a:t>
-            </a:r>
-            <a:r>
-              <a:rPr lang="nl-BE" dirty="0"/>
-              <a:t>): vind alle elementen van een bepaalde tag (bv. p)</a:t>
-            </a:r>
-          </a:p>
-        </p:txBody>
-      </p:sp>
-    </p:spTree>
-    <p:extLst>
-      <p:ext uri="{BB962C8B-B14F-4D97-AF65-F5344CB8AC3E}">
-        <p14:creationId xmlns:p14="http://schemas.microsoft.com/office/powerpoint/2010/main" val="3422462508"/>
       </p:ext>
     </p:extLst>
   </p:cSld>
@@ -18733,6 +19535,163 @@
           <p:cNvPr id="2" name="Titel 1">
             <a:extLst>
               <a:ext uri="{FF2B5EF4-FFF2-40B4-BE49-F238E27FC236}">
+                <a16:creationId xmlns:a16="http://schemas.microsoft.com/office/drawing/2014/main" id="{933D7D8F-B819-81BF-DA86-83726FAEF496}"/>
+              </a:ext>
+            </a:extLst>
+          </p:cNvPr>
+          <p:cNvSpPr>
+            <a:spLocks noGrp="1"/>
+          </p:cNvSpPr>
+          <p:nvPr>
+            <p:ph type="title"/>
+          </p:nvPr>
+        </p:nvSpPr>
+        <p:spPr/>
+        <p:txBody>
+          <a:bodyPr/>
+          <a:lstStyle/>
+          <a:p>
+            <a:r>
+              <a:rPr lang="nl-BE" dirty="0"/>
+              <a:t>document</a:t>
+            </a:r>
+          </a:p>
+        </p:txBody>
+      </p:sp>
+      <p:sp>
+        <p:nvSpPr>
+          <p:cNvPr id="3" name="Tijdelijke aanduiding voor inhoud 2">
+            <a:extLst>
+              <a:ext uri="{FF2B5EF4-FFF2-40B4-BE49-F238E27FC236}">
+                <a16:creationId xmlns:a16="http://schemas.microsoft.com/office/drawing/2014/main" id="{C823ABD3-3833-30EE-A10A-DC1C61D4913E}"/>
+              </a:ext>
+            </a:extLst>
+          </p:cNvPr>
+          <p:cNvSpPr>
+            <a:spLocks noGrp="1"/>
+          </p:cNvSpPr>
+          <p:nvPr>
+            <p:ph idx="1"/>
+          </p:nvPr>
+        </p:nvSpPr>
+        <p:spPr/>
+        <p:txBody>
+          <a:bodyPr/>
+          <a:lstStyle/>
+          <a:p>
+            <a:r>
+              <a:rPr lang="nl-BE" dirty="0"/>
+              <a:t>Is een object dat elementen op de webpagina kan vinden en aanpassen</a:t>
+            </a:r>
+          </a:p>
+          <a:p>
+            <a:r>
+              <a:rPr lang="nl-BE" dirty="0"/>
+              <a:t>Veelgebruikte functies:</a:t>
+            </a:r>
+          </a:p>
+          <a:p>
+            <a:pPr lvl="1"/>
+            <a:r>
+              <a:rPr lang="nl-BE" dirty="0" err="1"/>
+              <a:t>document.getElementById</a:t>
+            </a:r>
+            <a:r>
+              <a:rPr lang="nl-BE" dirty="0"/>
+              <a:t>(</a:t>
+            </a:r>
+            <a:r>
+              <a:rPr lang="nl-BE" dirty="0" err="1"/>
+              <a:t>id</a:t>
+            </a:r>
+            <a:r>
+              <a:rPr lang="nl-BE" dirty="0"/>
+              <a:t>): vind het eerste element met een bepaalde </a:t>
+            </a:r>
+            <a:r>
+              <a:rPr lang="nl-BE" dirty="0" err="1"/>
+              <a:t>id</a:t>
+            </a:r>
+            <a:r>
+              <a:rPr lang="nl-BE" dirty="0"/>
+              <a:t>-attribuut</a:t>
+            </a:r>
+          </a:p>
+          <a:p>
+            <a:pPr lvl="1"/>
+            <a:r>
+              <a:rPr lang="nl-BE" dirty="0" err="1"/>
+              <a:t>document.getElementsByClassName</a:t>
+            </a:r>
+            <a:r>
+              <a:rPr lang="nl-BE" dirty="0"/>
+              <a:t>(</a:t>
+            </a:r>
+            <a:r>
+              <a:rPr lang="nl-BE" i="1" dirty="0"/>
+              <a:t>name</a:t>
+            </a:r>
+            <a:r>
+              <a:rPr lang="nl-BE" dirty="0"/>
+              <a:t>): vind alle elementen die een bepaalde name als deel van hun class-attribuut hebben</a:t>
+            </a:r>
+          </a:p>
+          <a:p>
+            <a:pPr lvl="1"/>
+            <a:r>
+              <a:rPr lang="nl-BE" dirty="0" err="1"/>
+              <a:t>document.getElementsByTagName</a:t>
+            </a:r>
+            <a:r>
+              <a:rPr lang="nl-BE" dirty="0"/>
+              <a:t>(</a:t>
+            </a:r>
+            <a:r>
+              <a:rPr lang="nl-BE" i="1" dirty="0"/>
+              <a:t>name</a:t>
+            </a:r>
+            <a:r>
+              <a:rPr lang="nl-BE" dirty="0"/>
+              <a:t>): vind alle elementen van een bepaalde tag (bv. p)</a:t>
+            </a:r>
+          </a:p>
+        </p:txBody>
+      </p:sp>
+    </p:spTree>
+    <p:extLst>
+      <p:ext uri="{BB962C8B-B14F-4D97-AF65-F5344CB8AC3E}">
+        <p14:creationId xmlns:p14="http://schemas.microsoft.com/office/powerpoint/2010/main" val="3422462508"/>
+      </p:ext>
+    </p:extLst>
+  </p:cSld>
+  <p:clrMapOvr>
+    <a:masterClrMapping/>
+  </p:clrMapOvr>
+</p:sld>
+</file>
+
+<file path=ppt/slides/slide51.xml><?xml version="1.0" encoding="utf-8"?>
+<p:sld xmlns:a="http://schemas.openxmlformats.org/drawingml/2006/main" xmlns:r="http://schemas.openxmlformats.org/officeDocument/2006/relationships" xmlns:p="http://schemas.openxmlformats.org/presentationml/2006/main">
+  <p:cSld>
+    <p:spTree>
+      <p:nvGrpSpPr>
+        <p:cNvPr id="1" name=""/>
+        <p:cNvGrpSpPr/>
+        <p:nvPr/>
+      </p:nvGrpSpPr>
+      <p:grpSpPr>
+        <a:xfrm>
+          <a:off x="0" y="0"/>
+          <a:ext cx="0" cy="0"/>
+          <a:chOff x="0" y="0"/>
+          <a:chExt cx="0" cy="0"/>
+        </a:xfrm>
+      </p:grpSpPr>
+      <p:sp>
+        <p:nvSpPr>
+          <p:cNvPr id="2" name="Titel 1">
+            <a:extLst>
+              <a:ext uri="{FF2B5EF4-FFF2-40B4-BE49-F238E27FC236}">
                 <a16:creationId xmlns:a16="http://schemas.microsoft.com/office/drawing/2014/main" id="{25404786-8A1D-0771-9C7B-39778AE56BDF}"/>
               </a:ext>
             </a:extLst>
@@ -19233,7 +20192,7 @@
 </p:sld>
 </file>
 
-<file path=ppt/slides/slide51.xml><?xml version="1.0" encoding="utf-8"?>
+<file path=ppt/slides/slide52.xml><?xml version="1.0" encoding="utf-8"?>
 <p:sld xmlns:a="http://schemas.openxmlformats.org/drawingml/2006/main" xmlns:r="http://schemas.openxmlformats.org/officeDocument/2006/relationships" xmlns:p="http://schemas.openxmlformats.org/presentationml/2006/main">
   <p:cSld>
     <p:spTree>
@@ -19419,7 +20378,7 @@
 </p:sld>
 </file>
 
-<file path=ppt/slides/slide52.xml><?xml version="1.0" encoding="utf-8"?>
+<file path=ppt/slides/slide53.xml><?xml version="1.0" encoding="utf-8"?>
 <p:sld xmlns:a="http://schemas.openxmlformats.org/drawingml/2006/main" xmlns:r="http://schemas.openxmlformats.org/officeDocument/2006/relationships" xmlns:p="http://schemas.openxmlformats.org/presentationml/2006/main">
   <p:cSld>
     <p:spTree>
@@ -19564,7 +20523,7 @@
 </p:sld>
 </file>
 
-<file path=ppt/slides/slide53.xml><?xml version="1.0" encoding="utf-8"?>
+<file path=ppt/slides/slide54.xml><?xml version="1.0" encoding="utf-8"?>
 <p:sld xmlns:a="http://schemas.openxmlformats.org/drawingml/2006/main" xmlns:r="http://schemas.openxmlformats.org/officeDocument/2006/relationships" xmlns:p="http://schemas.openxmlformats.org/presentationml/2006/main">
   <p:cSld>
     <p:spTree>
@@ -19694,7 +20653,7 @@
 </p:sld>
 </file>
 
-<file path=ppt/slides/slide54.xml><?xml version="1.0" encoding="utf-8"?>
+<file path=ppt/slides/slide55.xml><?xml version="1.0" encoding="utf-8"?>
 <p:sld xmlns:a="http://schemas.openxmlformats.org/drawingml/2006/main" xmlns:r="http://schemas.openxmlformats.org/officeDocument/2006/relationships" xmlns:p="http://schemas.openxmlformats.org/presentationml/2006/main">
   <p:cSld>
     <p:spTree>
@@ -20070,7 +21029,7 @@
 </p:sld>
 </file>
 
-<file path=ppt/slides/slide55.xml><?xml version="1.0" encoding="utf-8"?>
+<file path=ppt/slides/slide56.xml><?xml version="1.0" encoding="utf-8"?>
 <p:sld xmlns:a="http://schemas.openxmlformats.org/drawingml/2006/main" xmlns:r="http://schemas.openxmlformats.org/officeDocument/2006/relationships" xmlns:p="http://schemas.openxmlformats.org/presentationml/2006/main">
   <p:cSld>
     <p:spTree>
@@ -20576,7 +21535,7 @@
 </p:sld>
 </file>
 
-<file path=ppt/slides/slide56.xml><?xml version="1.0" encoding="utf-8"?>
+<file path=ppt/slides/slide57.xml><?xml version="1.0" encoding="utf-8"?>
 <p:sld xmlns:a="http://schemas.openxmlformats.org/drawingml/2006/main" xmlns:r="http://schemas.openxmlformats.org/officeDocument/2006/relationships" xmlns:p="http://schemas.openxmlformats.org/presentationml/2006/main">
   <p:cSld>
     <p:spTree>
@@ -21140,7 +22099,7 @@
 </p:sld>
 </file>
 
-<file path=ppt/slides/slide57.xml><?xml version="1.0" encoding="utf-8"?>
+<file path=ppt/slides/slide58.xml><?xml version="1.0" encoding="utf-8"?>
 <p:sld xmlns:a="http://schemas.openxmlformats.org/drawingml/2006/main" xmlns:r="http://schemas.openxmlformats.org/officeDocument/2006/relationships" xmlns:p="http://schemas.openxmlformats.org/presentationml/2006/main">
   <p:cSld>
     <p:spTree>
@@ -21271,7 +22230,7 @@
 </p:sld>
 </file>
 
-<file path=ppt/slides/slide58.xml><?xml version="1.0" encoding="utf-8"?>
+<file path=ppt/slides/slide59.xml><?xml version="1.0" encoding="utf-8"?>
 <p:sld xmlns:a="http://schemas.openxmlformats.org/drawingml/2006/main" xmlns:r="http://schemas.openxmlformats.org/officeDocument/2006/relationships" xmlns:p="http://schemas.openxmlformats.org/presentationml/2006/main">
   <p:cSld>
     <p:spTree>
@@ -21423,193 +22382,6 @@
     <p:extLst>
       <p:ext uri="{BB962C8B-B14F-4D97-AF65-F5344CB8AC3E}">
         <p14:creationId xmlns:p14="http://schemas.microsoft.com/office/powerpoint/2010/main" val="3905181089"/>
-      </p:ext>
-    </p:extLst>
-  </p:cSld>
-  <p:clrMapOvr>
-    <a:masterClrMapping/>
-  </p:clrMapOvr>
-</p:sld>
-</file>
-
-<file path=ppt/slides/slide59.xml><?xml version="1.0" encoding="utf-8"?>
-<p:sld xmlns:a="http://schemas.openxmlformats.org/drawingml/2006/main" xmlns:r="http://schemas.openxmlformats.org/officeDocument/2006/relationships" xmlns:p="http://schemas.openxmlformats.org/presentationml/2006/main">
-  <p:cSld>
-    <p:spTree>
-      <p:nvGrpSpPr>
-        <p:cNvPr id="1" name=""/>
-        <p:cNvGrpSpPr/>
-        <p:nvPr/>
-      </p:nvGrpSpPr>
-      <p:grpSpPr>
-        <a:xfrm>
-          <a:off x="0" y="0"/>
-          <a:ext cx="0" cy="0"/>
-          <a:chOff x="0" y="0"/>
-          <a:chExt cx="0" cy="0"/>
-        </a:xfrm>
-      </p:grpSpPr>
-      <p:sp>
-        <p:nvSpPr>
-          <p:cNvPr id="2" name="Titel 1">
-            <a:extLst>
-              <a:ext uri="{FF2B5EF4-FFF2-40B4-BE49-F238E27FC236}">
-                <a16:creationId xmlns:a16="http://schemas.microsoft.com/office/drawing/2014/main" id="{8FBAE5E5-4D22-4F1E-1CCE-D0AA68193EC9}"/>
-              </a:ext>
-            </a:extLst>
-          </p:cNvPr>
-          <p:cNvSpPr>
-            <a:spLocks noGrp="1"/>
-          </p:cNvSpPr>
-          <p:nvPr>
-            <p:ph type="title"/>
-          </p:nvPr>
-        </p:nvSpPr>
-        <p:spPr/>
-        <p:txBody>
-          <a:bodyPr/>
-          <a:lstStyle/>
-          <a:p>
-            <a:r>
-              <a:rPr lang="nl-BE" dirty="0" err="1"/>
-              <a:t>querySelector</a:t>
-            </a:r>
-            <a:r>
-              <a:rPr lang="nl-BE" dirty="0"/>
-              <a:t>(</a:t>
-            </a:r>
-            <a:r>
-              <a:rPr lang="nl-BE" dirty="0" err="1"/>
-              <a:t>all</a:t>
-            </a:r>
-            <a:r>
-              <a:rPr lang="nl-BE" dirty="0"/>
-              <a:t>)</a:t>
-            </a:r>
-          </a:p>
-        </p:txBody>
-      </p:sp>
-      <p:sp>
-        <p:nvSpPr>
-          <p:cNvPr id="3" name="Tijdelijke aanduiding voor inhoud 2">
-            <a:extLst>
-              <a:ext uri="{FF2B5EF4-FFF2-40B4-BE49-F238E27FC236}">
-                <a16:creationId xmlns:a16="http://schemas.microsoft.com/office/drawing/2014/main" id="{E1516883-9243-7775-47B4-C2F68EAE7D57}"/>
-              </a:ext>
-            </a:extLst>
-          </p:cNvPr>
-          <p:cNvSpPr>
-            <a:spLocks noGrp="1"/>
-          </p:cNvSpPr>
-          <p:nvPr>
-            <p:ph idx="1"/>
-          </p:nvPr>
-        </p:nvSpPr>
-        <p:spPr/>
-        <p:txBody>
-          <a:bodyPr/>
-          <a:lstStyle/>
-          <a:p>
-            <a:pPr>
-              <a:lnSpc>
-                <a:spcPct val="200000"/>
-              </a:lnSpc>
-            </a:pPr>
-            <a:r>
-              <a:rPr lang="nl-BE" dirty="0"/>
-              <a:t>Geeft een statische lijst van </a:t>
-            </a:r>
-            <a:r>
-              <a:rPr lang="nl-BE" dirty="0" err="1"/>
-              <a:t>nodes</a:t>
-            </a:r>
-            <a:r>
-              <a:rPr lang="nl-BE" dirty="0"/>
-              <a:t> terug die kunnen worden gezocht met een </a:t>
-            </a:r>
-            <a:r>
-              <a:rPr lang="nl-BE" dirty="0" err="1"/>
-              <a:t>selector</a:t>
-            </a:r>
-            <a:r>
-              <a:rPr lang="nl-BE" dirty="0"/>
-              <a:t>.</a:t>
-            </a:r>
-          </a:p>
-          <a:p>
-            <a:pPr>
-              <a:lnSpc>
-                <a:spcPct val="200000"/>
-              </a:lnSpc>
-            </a:pPr>
-            <a:r>
-              <a:rPr lang="nl-BE" dirty="0" err="1"/>
-              <a:t>document.querySelector</a:t>
-            </a:r>
-            <a:r>
-              <a:rPr lang="nl-BE" dirty="0"/>
-              <a:t>() : 1 resultaat (1</a:t>
-            </a:r>
-            <a:r>
-              <a:rPr lang="nl-BE" baseline="30000" dirty="0"/>
-              <a:t>ste</a:t>
-            </a:r>
-            <a:r>
-              <a:rPr lang="nl-BE" dirty="0"/>
-              <a:t>)</a:t>
-            </a:r>
-          </a:p>
-          <a:p>
-            <a:pPr>
-              <a:lnSpc>
-                <a:spcPct val="200000"/>
-              </a:lnSpc>
-            </a:pPr>
-            <a:r>
-              <a:rPr lang="nl-BE" dirty="0" err="1"/>
-              <a:t>document.querySelectorAll</a:t>
-            </a:r>
-            <a:r>
-              <a:rPr lang="nl-BE" dirty="0"/>
-              <a:t>() : alle resultaten</a:t>
-            </a:r>
-          </a:p>
-        </p:txBody>
-      </p:sp>
-      <p:pic>
-        <p:nvPicPr>
-          <p:cNvPr id="5" name="Afbeelding 4">
-            <a:extLst>
-              <a:ext uri="{FF2B5EF4-FFF2-40B4-BE49-F238E27FC236}">
-                <a16:creationId xmlns:a16="http://schemas.microsoft.com/office/drawing/2014/main" id="{41231BCC-AC2E-95B7-4BE8-FF7176640E32}"/>
-              </a:ext>
-            </a:extLst>
-          </p:cNvPr>
-          <p:cNvPicPr>
-            <a:picLocks noChangeAspect="1"/>
-          </p:cNvPicPr>
-          <p:nvPr/>
-        </p:nvPicPr>
-        <p:blipFill>
-          <a:blip r:embed="rId2"/>
-          <a:stretch>
-            <a:fillRect/>
-          </a:stretch>
-        </p:blipFill>
-        <p:spPr>
-          <a:xfrm>
-            <a:off x="5340201" y="5427321"/>
-            <a:ext cx="5778797" cy="920797"/>
-          </a:xfrm>
-          <a:prstGeom prst="rect">
-            <a:avLst/>
-          </a:prstGeom>
-        </p:spPr>
-      </p:pic>
-    </p:spTree>
-    <p:extLst>
-      <p:ext uri="{BB962C8B-B14F-4D97-AF65-F5344CB8AC3E}">
-        <p14:creationId xmlns:p14="http://schemas.microsoft.com/office/powerpoint/2010/main" val="2081355932"/>
       </p:ext>
     </p:extLst>
   </p:cSld>
@@ -21744,6 +22516,193 @@
           <p:cNvPr id="2" name="Titel 1">
             <a:extLst>
               <a:ext uri="{FF2B5EF4-FFF2-40B4-BE49-F238E27FC236}">
+                <a16:creationId xmlns:a16="http://schemas.microsoft.com/office/drawing/2014/main" id="{8FBAE5E5-4D22-4F1E-1CCE-D0AA68193EC9}"/>
+              </a:ext>
+            </a:extLst>
+          </p:cNvPr>
+          <p:cNvSpPr>
+            <a:spLocks noGrp="1"/>
+          </p:cNvSpPr>
+          <p:nvPr>
+            <p:ph type="title"/>
+          </p:nvPr>
+        </p:nvSpPr>
+        <p:spPr/>
+        <p:txBody>
+          <a:bodyPr/>
+          <a:lstStyle/>
+          <a:p>
+            <a:r>
+              <a:rPr lang="nl-BE" dirty="0" err="1"/>
+              <a:t>querySelector</a:t>
+            </a:r>
+            <a:r>
+              <a:rPr lang="nl-BE" dirty="0"/>
+              <a:t>(</a:t>
+            </a:r>
+            <a:r>
+              <a:rPr lang="nl-BE" dirty="0" err="1"/>
+              <a:t>all</a:t>
+            </a:r>
+            <a:r>
+              <a:rPr lang="nl-BE" dirty="0"/>
+              <a:t>)</a:t>
+            </a:r>
+          </a:p>
+        </p:txBody>
+      </p:sp>
+      <p:sp>
+        <p:nvSpPr>
+          <p:cNvPr id="3" name="Tijdelijke aanduiding voor inhoud 2">
+            <a:extLst>
+              <a:ext uri="{FF2B5EF4-FFF2-40B4-BE49-F238E27FC236}">
+                <a16:creationId xmlns:a16="http://schemas.microsoft.com/office/drawing/2014/main" id="{E1516883-9243-7775-47B4-C2F68EAE7D57}"/>
+              </a:ext>
+            </a:extLst>
+          </p:cNvPr>
+          <p:cNvSpPr>
+            <a:spLocks noGrp="1"/>
+          </p:cNvSpPr>
+          <p:nvPr>
+            <p:ph idx="1"/>
+          </p:nvPr>
+        </p:nvSpPr>
+        <p:spPr/>
+        <p:txBody>
+          <a:bodyPr/>
+          <a:lstStyle/>
+          <a:p>
+            <a:pPr>
+              <a:lnSpc>
+                <a:spcPct val="200000"/>
+              </a:lnSpc>
+            </a:pPr>
+            <a:r>
+              <a:rPr lang="nl-BE" dirty="0"/>
+              <a:t>Geeft een statische lijst van </a:t>
+            </a:r>
+            <a:r>
+              <a:rPr lang="nl-BE" dirty="0" err="1"/>
+              <a:t>nodes</a:t>
+            </a:r>
+            <a:r>
+              <a:rPr lang="nl-BE" dirty="0"/>
+              <a:t> terug die kunnen worden gezocht met een </a:t>
+            </a:r>
+            <a:r>
+              <a:rPr lang="nl-BE" dirty="0" err="1"/>
+              <a:t>selector</a:t>
+            </a:r>
+            <a:r>
+              <a:rPr lang="nl-BE" dirty="0"/>
+              <a:t>.</a:t>
+            </a:r>
+          </a:p>
+          <a:p>
+            <a:pPr>
+              <a:lnSpc>
+                <a:spcPct val="200000"/>
+              </a:lnSpc>
+            </a:pPr>
+            <a:r>
+              <a:rPr lang="nl-BE" dirty="0" err="1"/>
+              <a:t>document.querySelector</a:t>
+            </a:r>
+            <a:r>
+              <a:rPr lang="nl-BE" dirty="0"/>
+              <a:t>() : 1 resultaat (1</a:t>
+            </a:r>
+            <a:r>
+              <a:rPr lang="nl-BE" baseline="30000" dirty="0"/>
+              <a:t>ste</a:t>
+            </a:r>
+            <a:r>
+              <a:rPr lang="nl-BE" dirty="0"/>
+              <a:t>)</a:t>
+            </a:r>
+          </a:p>
+          <a:p>
+            <a:pPr>
+              <a:lnSpc>
+                <a:spcPct val="200000"/>
+              </a:lnSpc>
+            </a:pPr>
+            <a:r>
+              <a:rPr lang="nl-BE" dirty="0" err="1"/>
+              <a:t>document.querySelectorAll</a:t>
+            </a:r>
+            <a:r>
+              <a:rPr lang="nl-BE" dirty="0"/>
+              <a:t>() : alle resultaten</a:t>
+            </a:r>
+          </a:p>
+        </p:txBody>
+      </p:sp>
+      <p:pic>
+        <p:nvPicPr>
+          <p:cNvPr id="5" name="Afbeelding 4">
+            <a:extLst>
+              <a:ext uri="{FF2B5EF4-FFF2-40B4-BE49-F238E27FC236}">
+                <a16:creationId xmlns:a16="http://schemas.microsoft.com/office/drawing/2014/main" id="{41231BCC-AC2E-95B7-4BE8-FF7176640E32}"/>
+              </a:ext>
+            </a:extLst>
+          </p:cNvPr>
+          <p:cNvPicPr>
+            <a:picLocks noChangeAspect="1"/>
+          </p:cNvPicPr>
+          <p:nvPr/>
+        </p:nvPicPr>
+        <p:blipFill>
+          <a:blip r:embed="rId2"/>
+          <a:stretch>
+            <a:fillRect/>
+          </a:stretch>
+        </p:blipFill>
+        <p:spPr>
+          <a:xfrm>
+            <a:off x="5340201" y="5427321"/>
+            <a:ext cx="5778797" cy="920797"/>
+          </a:xfrm>
+          <a:prstGeom prst="rect">
+            <a:avLst/>
+          </a:prstGeom>
+        </p:spPr>
+      </p:pic>
+    </p:spTree>
+    <p:extLst>
+      <p:ext uri="{BB962C8B-B14F-4D97-AF65-F5344CB8AC3E}">
+        <p14:creationId xmlns:p14="http://schemas.microsoft.com/office/powerpoint/2010/main" val="2081355932"/>
+      </p:ext>
+    </p:extLst>
+  </p:cSld>
+  <p:clrMapOvr>
+    <a:masterClrMapping/>
+  </p:clrMapOvr>
+</p:sld>
+</file>
+
+<file path=ppt/slides/slide61.xml><?xml version="1.0" encoding="utf-8"?>
+<p:sld xmlns:a="http://schemas.openxmlformats.org/drawingml/2006/main" xmlns:r="http://schemas.openxmlformats.org/officeDocument/2006/relationships" xmlns:p="http://schemas.openxmlformats.org/presentationml/2006/main">
+  <p:cSld>
+    <p:spTree>
+      <p:nvGrpSpPr>
+        <p:cNvPr id="1" name=""/>
+        <p:cNvGrpSpPr/>
+        <p:nvPr/>
+      </p:nvGrpSpPr>
+      <p:grpSpPr>
+        <a:xfrm>
+          <a:off x="0" y="0"/>
+          <a:ext cx="0" cy="0"/>
+          <a:chOff x="0" y="0"/>
+          <a:chExt cx="0" cy="0"/>
+        </a:xfrm>
+      </p:grpSpPr>
+      <p:sp>
+        <p:nvSpPr>
+          <p:cNvPr id="2" name="Titel 1">
+            <a:extLst>
+              <a:ext uri="{FF2B5EF4-FFF2-40B4-BE49-F238E27FC236}">
                 <a16:creationId xmlns:a16="http://schemas.microsoft.com/office/drawing/2014/main" id="{AA871537-1A64-BEFD-2571-A48171A36042}"/>
               </a:ext>
             </a:extLst>
@@ -21913,7 +22872,7 @@
 </p:sld>
 </file>
 
-<file path=ppt/slides/slide61.xml><?xml version="1.0" encoding="utf-8"?>
+<file path=ppt/slides/slide62.xml><?xml version="1.0" encoding="utf-8"?>
 <p:sld xmlns:a="http://schemas.openxmlformats.org/drawingml/2006/main" xmlns:r="http://schemas.openxmlformats.org/officeDocument/2006/relationships" xmlns:p="http://schemas.openxmlformats.org/presentationml/2006/main">
   <p:cSld>
     <p:spTree>
@@ -22059,7 +23018,7 @@
 </p:sld>
 </file>
 
-<file path=ppt/slides/slide62.xml><?xml version="1.0" encoding="utf-8"?>
+<file path=ppt/slides/slide63.xml><?xml version="1.0" encoding="utf-8"?>
 <p:sld xmlns:a="http://schemas.openxmlformats.org/drawingml/2006/main" xmlns:r="http://schemas.openxmlformats.org/officeDocument/2006/relationships" xmlns:p="http://schemas.openxmlformats.org/presentationml/2006/main">
   <p:cSld>
     <p:spTree>
@@ -22266,7 +23225,7 @@
 </p:sld>
 </file>
 
-<file path=ppt/slides/slide63.xml><?xml version="1.0" encoding="utf-8"?>
+<file path=ppt/slides/slide64.xml><?xml version="1.0" encoding="utf-8"?>
 <p:sld xmlns:a="http://schemas.openxmlformats.org/drawingml/2006/main" xmlns:r="http://schemas.openxmlformats.org/officeDocument/2006/relationships" xmlns:p="http://schemas.openxmlformats.org/presentationml/2006/main">
   <p:cSld>
     <p:spTree>
@@ -22652,7 +23611,7 @@
 </p:sld>
 </file>
 
-<file path=ppt/slides/slide64.xml><?xml version="1.0" encoding="utf-8"?>
+<file path=ppt/slides/slide65.xml><?xml version="1.0" encoding="utf-8"?>
 <p:sld xmlns:a="http://schemas.openxmlformats.org/drawingml/2006/main" xmlns:r="http://schemas.openxmlformats.org/officeDocument/2006/relationships" xmlns:p="http://schemas.openxmlformats.org/presentationml/2006/main">
   <p:cSld>
     <p:spTree>

</xml_diff>